<commit_message>
Upgraded the logos and images. Also upgraded the project panel so that it maps file extensions better.
</commit_message>
<xml_diff>
--- a/Resources/Hoop-Graphics.pptx
+++ b/Resources/Hoop-Graphics.pptx
@@ -7,6 +7,7 @@
   <p:sldIdLst>
     <p:sldId id="256" r:id="rId2"/>
     <p:sldId id="257" r:id="rId3"/>
+    <p:sldId id="258" r:id="rId4"/>
   </p:sldIdLst>
   <p:sldSz cx="9144000" cy="6858000" type="screen4x3"/>
   <p:notesSz cx="6858000" cy="9144000"/>
@@ -290,7 +291,7 @@
             <a:fld id="{2CCE3EF9-71E5-4228-A448-CBA7515D943E}" type="datetimeFigureOut">
               <a:rPr lang="en-US" smtClean="0"/>
               <a:pPr/>
-              <a:t>7/25/2012</a:t>
+              <a:t>8/17/2012</a:t>
             </a:fld>
             <a:endParaRPr lang="en-US"/>
           </a:p>
@@ -457,7 +458,7 @@
             <a:fld id="{2CCE3EF9-71E5-4228-A448-CBA7515D943E}" type="datetimeFigureOut">
               <a:rPr lang="en-US" smtClean="0"/>
               <a:pPr/>
-              <a:t>7/25/2012</a:t>
+              <a:t>8/17/2012</a:t>
             </a:fld>
             <a:endParaRPr lang="en-US"/>
           </a:p>
@@ -634,7 +635,7 @@
             <a:fld id="{2CCE3EF9-71E5-4228-A448-CBA7515D943E}" type="datetimeFigureOut">
               <a:rPr lang="en-US" smtClean="0"/>
               <a:pPr/>
-              <a:t>7/25/2012</a:t>
+              <a:t>8/17/2012</a:t>
             </a:fld>
             <a:endParaRPr lang="en-US"/>
           </a:p>
@@ -801,7 +802,7 @@
             <a:fld id="{2CCE3EF9-71E5-4228-A448-CBA7515D943E}" type="datetimeFigureOut">
               <a:rPr lang="en-US" smtClean="0"/>
               <a:pPr/>
-              <a:t>7/25/2012</a:t>
+              <a:t>8/17/2012</a:t>
             </a:fld>
             <a:endParaRPr lang="en-US"/>
           </a:p>
@@ -1044,7 +1045,7 @@
             <a:fld id="{2CCE3EF9-71E5-4228-A448-CBA7515D943E}" type="datetimeFigureOut">
               <a:rPr lang="en-US" smtClean="0"/>
               <a:pPr/>
-              <a:t>7/25/2012</a:t>
+              <a:t>8/17/2012</a:t>
             </a:fld>
             <a:endParaRPr lang="en-US"/>
           </a:p>
@@ -1329,7 +1330,7 @@
             <a:fld id="{2CCE3EF9-71E5-4228-A448-CBA7515D943E}" type="datetimeFigureOut">
               <a:rPr lang="en-US" smtClean="0"/>
               <a:pPr/>
-              <a:t>7/25/2012</a:t>
+              <a:t>8/17/2012</a:t>
             </a:fld>
             <a:endParaRPr lang="en-US"/>
           </a:p>
@@ -1748,7 +1749,7 @@
             <a:fld id="{2CCE3EF9-71E5-4228-A448-CBA7515D943E}" type="datetimeFigureOut">
               <a:rPr lang="en-US" smtClean="0"/>
               <a:pPr/>
-              <a:t>7/25/2012</a:t>
+              <a:t>8/17/2012</a:t>
             </a:fld>
             <a:endParaRPr lang="en-US"/>
           </a:p>
@@ -1863,7 +1864,7 @@
             <a:fld id="{2CCE3EF9-71E5-4228-A448-CBA7515D943E}" type="datetimeFigureOut">
               <a:rPr lang="en-US" smtClean="0"/>
               <a:pPr/>
-              <a:t>7/25/2012</a:t>
+              <a:t>8/17/2012</a:t>
             </a:fld>
             <a:endParaRPr lang="en-US"/>
           </a:p>
@@ -1955,7 +1956,7 @@
             <a:fld id="{2CCE3EF9-71E5-4228-A448-CBA7515D943E}" type="datetimeFigureOut">
               <a:rPr lang="en-US" smtClean="0"/>
               <a:pPr/>
-              <a:t>7/25/2012</a:t>
+              <a:t>8/17/2012</a:t>
             </a:fld>
             <a:endParaRPr lang="en-US"/>
           </a:p>
@@ -2229,7 +2230,7 @@
             <a:fld id="{2CCE3EF9-71E5-4228-A448-CBA7515D943E}" type="datetimeFigureOut">
               <a:rPr lang="en-US" smtClean="0"/>
               <a:pPr/>
-              <a:t>7/25/2012</a:t>
+              <a:t>8/17/2012</a:t>
             </a:fld>
             <a:endParaRPr lang="en-US"/>
           </a:p>
@@ -2479,7 +2480,7 @@
             <a:fld id="{2CCE3EF9-71E5-4228-A448-CBA7515D943E}" type="datetimeFigureOut">
               <a:rPr lang="en-US" smtClean="0"/>
               <a:pPr/>
-              <a:t>7/25/2012</a:t>
+              <a:t>8/17/2012</a:t>
             </a:fld>
             <a:endParaRPr lang="en-US"/>
           </a:p>
@@ -2689,7 +2690,7 @@
             <a:fld id="{2CCE3EF9-71E5-4228-A448-CBA7515D943E}" type="datetimeFigureOut">
               <a:rPr lang="en-US" smtClean="0"/>
               <a:pPr/>
-              <a:t>7/25/2012</a:t>
+              <a:t>8/17/2012</a:t>
             </a:fld>
             <a:endParaRPr lang="en-US"/>
           </a:p>
@@ -9385,6 +9386,775 @@
 </p:sld>
 </file>
 
+<file path=ppt/slides/slide3.xml><?xml version="1.0" encoding="utf-8"?>
+<p:sld xmlns:a="http://schemas.openxmlformats.org/drawingml/2006/main" xmlns:r="http://schemas.openxmlformats.org/officeDocument/2006/relationships" xmlns:p="http://schemas.openxmlformats.org/presentationml/2006/main">
+  <p:cSld>
+    <p:spTree>
+      <p:nvGrpSpPr>
+        <p:cNvPr id="1" name=""/>
+        <p:cNvGrpSpPr/>
+        <p:nvPr/>
+      </p:nvGrpSpPr>
+      <p:grpSpPr>
+        <a:xfrm>
+          <a:off x="0" y="0"/>
+          <a:ext cx="0" cy="0"/>
+          <a:chOff x="0" y="0"/>
+          <a:chExt cx="0" cy="0"/>
+        </a:xfrm>
+      </p:grpSpPr>
+      <p:grpSp>
+        <p:nvGrpSpPr>
+          <p:cNvPr id="7" name="Group 6"/>
+          <p:cNvGrpSpPr/>
+          <p:nvPr/>
+        </p:nvGrpSpPr>
+        <p:grpSpPr>
+          <a:xfrm>
+            <a:off x="1122998" y="706704"/>
+            <a:ext cx="1353872" cy="2816451"/>
+            <a:chOff x="1122998" y="706704"/>
+            <a:chExt cx="1353872" cy="2816451"/>
+          </a:xfrm>
+        </p:grpSpPr>
+        <p:sp>
+          <p:nvSpPr>
+            <p:cNvPr id="4" name="Freeform 8"/>
+            <p:cNvSpPr>
+              <a:spLocks noEditPoints="1"/>
+            </p:cNvSpPr>
+            <p:nvPr/>
+          </p:nvSpPr>
+          <p:spPr bwMode="auto">
+            <a:xfrm rot="11677771">
+              <a:off x="1122998" y="743584"/>
+              <a:ext cx="1353872" cy="2665440"/>
+            </a:xfrm>
+            <a:custGeom>
+              <a:avLst/>
+              <a:gdLst/>
+              <a:ahLst/>
+              <a:cxnLst>
+                <a:cxn ang="0">
+                  <a:pos x="200" y="2"/>
+                </a:cxn>
+                <a:cxn ang="0">
+                  <a:pos x="188" y="0"/>
+                </a:cxn>
+                <a:cxn ang="0">
+                  <a:pos x="150" y="12"/>
+                </a:cxn>
+                <a:cxn ang="0">
+                  <a:pos x="98" y="62"/>
+                </a:cxn>
+                <a:cxn ang="0">
+                  <a:pos x="56" y="148"/>
+                </a:cxn>
+                <a:cxn ang="0">
+                  <a:pos x="24" y="262"/>
+                </a:cxn>
+                <a:cxn ang="0">
+                  <a:pos x="4" y="400"/>
+                </a:cxn>
+                <a:cxn ang="0">
+                  <a:pos x="0" y="502"/>
+                </a:cxn>
+                <a:cxn ang="0">
+                  <a:pos x="10" y="650"/>
+                </a:cxn>
+                <a:cxn ang="0">
+                  <a:pos x="32" y="782"/>
+                </a:cxn>
+                <a:cxn ang="0">
+                  <a:pos x="68" y="888"/>
+                </a:cxn>
+                <a:cxn ang="0">
+                  <a:pos x="116" y="962"/>
+                </a:cxn>
+                <a:cxn ang="0">
+                  <a:pos x="168" y="1000"/>
+                </a:cxn>
+                <a:cxn ang="0">
+                  <a:pos x="188" y="1002"/>
+                </a:cxn>
+                <a:cxn ang="0">
+                  <a:pos x="210" y="1002"/>
+                </a:cxn>
+                <a:cxn ang="0">
+                  <a:pos x="230" y="1000"/>
+                </a:cxn>
+                <a:cxn ang="0">
+                  <a:pos x="286" y="962"/>
+                </a:cxn>
+                <a:cxn ang="0">
+                  <a:pos x="334" y="888"/>
+                </a:cxn>
+                <a:cxn ang="0">
+                  <a:pos x="372" y="782"/>
+                </a:cxn>
+                <a:cxn ang="0">
+                  <a:pos x="396" y="650"/>
+                </a:cxn>
+                <a:cxn ang="0">
+                  <a:pos x="404" y="502"/>
+                </a:cxn>
+                <a:cxn ang="0">
+                  <a:pos x="400" y="400"/>
+                </a:cxn>
+                <a:cxn ang="0">
+                  <a:pos x="380" y="262"/>
+                </a:cxn>
+                <a:cxn ang="0">
+                  <a:pos x="348" y="148"/>
+                </a:cxn>
+                <a:cxn ang="0">
+                  <a:pos x="302" y="62"/>
+                </a:cxn>
+                <a:cxn ang="0">
+                  <a:pos x="250" y="12"/>
+                </a:cxn>
+                <a:cxn ang="0">
+                  <a:pos x="210" y="0"/>
+                </a:cxn>
+                <a:cxn ang="0">
+                  <a:pos x="44" y="502"/>
+                </a:cxn>
+                <a:cxn ang="0">
+                  <a:pos x="50" y="390"/>
+                </a:cxn>
+                <a:cxn ang="0">
+                  <a:pos x="66" y="290"/>
+                </a:cxn>
+                <a:cxn ang="0">
+                  <a:pos x="88" y="206"/>
+                </a:cxn>
+                <a:cxn ang="0">
+                  <a:pos x="118" y="146"/>
+                </a:cxn>
+                <a:cxn ang="0">
+                  <a:pos x="152" y="110"/>
+                </a:cxn>
+                <a:cxn ang="0">
+                  <a:pos x="176" y="110"/>
+                </a:cxn>
+                <a:cxn ang="0">
+                  <a:pos x="210" y="146"/>
+                </a:cxn>
+                <a:cxn ang="0">
+                  <a:pos x="238" y="206"/>
+                </a:cxn>
+                <a:cxn ang="0">
+                  <a:pos x="260" y="290"/>
+                </a:cxn>
+                <a:cxn ang="0">
+                  <a:pos x="280" y="502"/>
+                </a:cxn>
+                <a:cxn ang="0">
+                  <a:pos x="272" y="648"/>
+                </a:cxn>
+                <a:cxn ang="0">
+                  <a:pos x="246" y="772"/>
+                </a:cxn>
+                <a:cxn ang="0">
+                  <a:pos x="220" y="840"/>
+                </a:cxn>
+                <a:cxn ang="0">
+                  <a:pos x="188" y="884"/>
+                </a:cxn>
+                <a:cxn ang="0">
+                  <a:pos x="164" y="898"/>
+                </a:cxn>
+                <a:cxn ang="0">
+                  <a:pos x="128" y="872"/>
+                </a:cxn>
+                <a:cxn ang="0">
+                  <a:pos x="98" y="820"/>
+                </a:cxn>
+                <a:cxn ang="0">
+                  <a:pos x="72" y="744"/>
+                </a:cxn>
+                <a:cxn ang="0">
+                  <a:pos x="54" y="648"/>
+                </a:cxn>
+                <a:cxn ang="0">
+                  <a:pos x="46" y="540"/>
+                </a:cxn>
+              </a:cxnLst>
+              <a:rect l="0" t="0" r="r" b="b"/>
+              <a:pathLst>
+                <a:path w="404" h="1002">
+                  <a:moveTo>
+                    <a:pt x="210" y="0"/>
+                  </a:moveTo>
+                  <a:lnTo>
+                    <a:pt x="210" y="0"/>
+                  </a:lnTo>
+                  <a:lnTo>
+                    <a:pt x="200" y="2"/>
+                  </a:lnTo>
+                  <a:lnTo>
+                    <a:pt x="200" y="2"/>
+                  </a:lnTo>
+                  <a:lnTo>
+                    <a:pt x="188" y="0"/>
+                  </a:lnTo>
+                  <a:lnTo>
+                    <a:pt x="188" y="0"/>
+                  </a:lnTo>
+                  <a:lnTo>
+                    <a:pt x="178" y="2"/>
+                  </a:lnTo>
+                  <a:lnTo>
+                    <a:pt x="168" y="4"/>
+                  </a:lnTo>
+                  <a:lnTo>
+                    <a:pt x="150" y="12"/>
+                  </a:lnTo>
+                  <a:lnTo>
+                    <a:pt x="132" y="24"/>
+                  </a:lnTo>
+                  <a:lnTo>
+                    <a:pt x="116" y="40"/>
+                  </a:lnTo>
+                  <a:lnTo>
+                    <a:pt x="98" y="62"/>
+                  </a:lnTo>
+                  <a:lnTo>
+                    <a:pt x="84" y="86"/>
+                  </a:lnTo>
+                  <a:lnTo>
+                    <a:pt x="68" y="116"/>
+                  </a:lnTo>
+                  <a:lnTo>
+                    <a:pt x="56" y="148"/>
+                  </a:lnTo>
+                  <a:lnTo>
+                    <a:pt x="44" y="184"/>
+                  </a:lnTo>
+                  <a:lnTo>
+                    <a:pt x="32" y="222"/>
+                  </a:lnTo>
+                  <a:lnTo>
+                    <a:pt x="24" y="262"/>
+                  </a:lnTo>
+                  <a:lnTo>
+                    <a:pt x="16" y="306"/>
+                  </a:lnTo>
+                  <a:lnTo>
+                    <a:pt x="10" y="352"/>
+                  </a:lnTo>
+                  <a:lnTo>
+                    <a:pt x="4" y="400"/>
+                  </a:lnTo>
+                  <a:lnTo>
+                    <a:pt x="2" y="450"/>
+                  </a:lnTo>
+                  <a:lnTo>
+                    <a:pt x="0" y="502"/>
+                  </a:lnTo>
+                  <a:lnTo>
+                    <a:pt x="0" y="502"/>
+                  </a:lnTo>
+                  <a:lnTo>
+                    <a:pt x="2" y="552"/>
+                  </a:lnTo>
+                  <a:lnTo>
+                    <a:pt x="4" y="602"/>
+                  </a:lnTo>
+                  <a:lnTo>
+                    <a:pt x="10" y="650"/>
+                  </a:lnTo>
+                  <a:lnTo>
+                    <a:pt x="16" y="696"/>
+                  </a:lnTo>
+                  <a:lnTo>
+                    <a:pt x="24" y="740"/>
+                  </a:lnTo>
+                  <a:lnTo>
+                    <a:pt x="32" y="782"/>
+                  </a:lnTo>
+                  <a:lnTo>
+                    <a:pt x="44" y="820"/>
+                  </a:lnTo>
+                  <a:lnTo>
+                    <a:pt x="56" y="856"/>
+                  </a:lnTo>
+                  <a:lnTo>
+                    <a:pt x="68" y="888"/>
+                  </a:lnTo>
+                  <a:lnTo>
+                    <a:pt x="84" y="916"/>
+                  </a:lnTo>
+                  <a:lnTo>
+                    <a:pt x="98" y="942"/>
+                  </a:lnTo>
+                  <a:lnTo>
+                    <a:pt x="116" y="962"/>
+                  </a:lnTo>
+                  <a:lnTo>
+                    <a:pt x="132" y="980"/>
+                  </a:lnTo>
+                  <a:lnTo>
+                    <a:pt x="150" y="992"/>
+                  </a:lnTo>
+                  <a:lnTo>
+                    <a:pt x="168" y="1000"/>
+                  </a:lnTo>
+                  <a:lnTo>
+                    <a:pt x="178" y="1002"/>
+                  </a:lnTo>
+                  <a:lnTo>
+                    <a:pt x="188" y="1002"/>
+                  </a:lnTo>
+                  <a:lnTo>
+                    <a:pt x="188" y="1002"/>
+                  </a:lnTo>
+                  <a:lnTo>
+                    <a:pt x="200" y="1002"/>
+                  </a:lnTo>
+                  <a:lnTo>
+                    <a:pt x="200" y="1002"/>
+                  </a:lnTo>
+                  <a:lnTo>
+                    <a:pt x="210" y="1002"/>
+                  </a:lnTo>
+                  <a:lnTo>
+                    <a:pt x="210" y="1002"/>
+                  </a:lnTo>
+                  <a:lnTo>
+                    <a:pt x="220" y="1002"/>
+                  </a:lnTo>
+                  <a:lnTo>
+                    <a:pt x="230" y="1000"/>
+                  </a:lnTo>
+                  <a:lnTo>
+                    <a:pt x="250" y="992"/>
+                  </a:lnTo>
+                  <a:lnTo>
+                    <a:pt x="268" y="980"/>
+                  </a:lnTo>
+                  <a:lnTo>
+                    <a:pt x="286" y="962"/>
+                  </a:lnTo>
+                  <a:lnTo>
+                    <a:pt x="302" y="942"/>
+                  </a:lnTo>
+                  <a:lnTo>
+                    <a:pt x="318" y="916"/>
+                  </a:lnTo>
+                  <a:lnTo>
+                    <a:pt x="334" y="888"/>
+                  </a:lnTo>
+                  <a:lnTo>
+                    <a:pt x="348" y="856"/>
+                  </a:lnTo>
+                  <a:lnTo>
+                    <a:pt x="360" y="820"/>
+                  </a:lnTo>
+                  <a:lnTo>
+                    <a:pt x="372" y="782"/>
+                  </a:lnTo>
+                  <a:lnTo>
+                    <a:pt x="380" y="740"/>
+                  </a:lnTo>
+                  <a:lnTo>
+                    <a:pt x="390" y="696"/>
+                  </a:lnTo>
+                  <a:lnTo>
+                    <a:pt x="396" y="650"/>
+                  </a:lnTo>
+                  <a:lnTo>
+                    <a:pt x="400" y="602"/>
+                  </a:lnTo>
+                  <a:lnTo>
+                    <a:pt x="404" y="552"/>
+                  </a:lnTo>
+                  <a:lnTo>
+                    <a:pt x="404" y="502"/>
+                  </a:lnTo>
+                  <a:lnTo>
+                    <a:pt x="404" y="502"/>
+                  </a:lnTo>
+                  <a:lnTo>
+                    <a:pt x="404" y="450"/>
+                  </a:lnTo>
+                  <a:lnTo>
+                    <a:pt x="400" y="400"/>
+                  </a:lnTo>
+                  <a:lnTo>
+                    <a:pt x="396" y="352"/>
+                  </a:lnTo>
+                  <a:lnTo>
+                    <a:pt x="390" y="306"/>
+                  </a:lnTo>
+                  <a:lnTo>
+                    <a:pt x="380" y="262"/>
+                  </a:lnTo>
+                  <a:lnTo>
+                    <a:pt x="372" y="222"/>
+                  </a:lnTo>
+                  <a:lnTo>
+                    <a:pt x="360" y="184"/>
+                  </a:lnTo>
+                  <a:lnTo>
+                    <a:pt x="348" y="148"/>
+                  </a:lnTo>
+                  <a:lnTo>
+                    <a:pt x="334" y="116"/>
+                  </a:lnTo>
+                  <a:lnTo>
+                    <a:pt x="318" y="86"/>
+                  </a:lnTo>
+                  <a:lnTo>
+                    <a:pt x="302" y="62"/>
+                  </a:lnTo>
+                  <a:lnTo>
+                    <a:pt x="286" y="40"/>
+                  </a:lnTo>
+                  <a:lnTo>
+                    <a:pt x="268" y="24"/>
+                  </a:lnTo>
+                  <a:lnTo>
+                    <a:pt x="250" y="12"/>
+                  </a:lnTo>
+                  <a:lnTo>
+                    <a:pt x="230" y="4"/>
+                  </a:lnTo>
+                  <a:lnTo>
+                    <a:pt x="220" y="2"/>
+                  </a:lnTo>
+                  <a:lnTo>
+                    <a:pt x="210" y="0"/>
+                  </a:lnTo>
+                  <a:lnTo>
+                    <a:pt x="210" y="0"/>
+                  </a:lnTo>
+                  <a:close/>
+                  <a:moveTo>
+                    <a:pt x="44" y="502"/>
+                  </a:moveTo>
+                  <a:lnTo>
+                    <a:pt x="44" y="502"/>
+                  </a:lnTo>
+                  <a:lnTo>
+                    <a:pt x="46" y="462"/>
+                  </a:lnTo>
+                  <a:lnTo>
+                    <a:pt x="48" y="426"/>
+                  </a:lnTo>
+                  <a:lnTo>
+                    <a:pt x="50" y="390"/>
+                  </a:lnTo>
+                  <a:lnTo>
+                    <a:pt x="54" y="354"/>
+                  </a:lnTo>
+                  <a:lnTo>
+                    <a:pt x="60" y="320"/>
+                  </a:lnTo>
+                  <a:lnTo>
+                    <a:pt x="66" y="290"/>
+                  </a:lnTo>
+                  <a:lnTo>
+                    <a:pt x="72" y="260"/>
+                  </a:lnTo>
+                  <a:lnTo>
+                    <a:pt x="80" y="232"/>
+                  </a:lnTo>
+                  <a:lnTo>
+                    <a:pt x="88" y="206"/>
+                  </a:lnTo>
+                  <a:lnTo>
+                    <a:pt x="98" y="184"/>
+                  </a:lnTo>
+                  <a:lnTo>
+                    <a:pt x="108" y="164"/>
+                  </a:lnTo>
+                  <a:lnTo>
+                    <a:pt x="118" y="146"/>
+                  </a:lnTo>
+                  <a:lnTo>
+                    <a:pt x="128" y="130"/>
+                  </a:lnTo>
+                  <a:lnTo>
+                    <a:pt x="140" y="120"/>
+                  </a:lnTo>
+                  <a:lnTo>
+                    <a:pt x="152" y="110"/>
+                  </a:lnTo>
+                  <a:lnTo>
+                    <a:pt x="164" y="106"/>
+                  </a:lnTo>
+                  <a:lnTo>
+                    <a:pt x="164" y="106"/>
+                  </a:lnTo>
+                  <a:lnTo>
+                    <a:pt x="176" y="110"/>
+                  </a:lnTo>
+                  <a:lnTo>
+                    <a:pt x="188" y="120"/>
+                  </a:lnTo>
+                  <a:lnTo>
+                    <a:pt x="200" y="130"/>
+                  </a:lnTo>
+                  <a:lnTo>
+                    <a:pt x="210" y="146"/>
+                  </a:lnTo>
+                  <a:lnTo>
+                    <a:pt x="220" y="164"/>
+                  </a:lnTo>
+                  <a:lnTo>
+                    <a:pt x="230" y="184"/>
+                  </a:lnTo>
+                  <a:lnTo>
+                    <a:pt x="238" y="206"/>
+                  </a:lnTo>
+                  <a:lnTo>
+                    <a:pt x="246" y="232"/>
+                  </a:lnTo>
+                  <a:lnTo>
+                    <a:pt x="254" y="260"/>
+                  </a:lnTo>
+                  <a:lnTo>
+                    <a:pt x="260" y="290"/>
+                  </a:lnTo>
+                  <a:lnTo>
+                    <a:pt x="272" y="354"/>
+                  </a:lnTo>
+                  <a:lnTo>
+                    <a:pt x="278" y="426"/>
+                  </a:lnTo>
+                  <a:lnTo>
+                    <a:pt x="280" y="502"/>
+                  </a:lnTo>
+                  <a:lnTo>
+                    <a:pt x="280" y="502"/>
+                  </a:lnTo>
+                  <a:lnTo>
+                    <a:pt x="278" y="578"/>
+                  </a:lnTo>
+                  <a:lnTo>
+                    <a:pt x="272" y="648"/>
+                  </a:lnTo>
+                  <a:lnTo>
+                    <a:pt x="260" y="714"/>
+                  </a:lnTo>
+                  <a:lnTo>
+                    <a:pt x="254" y="744"/>
+                  </a:lnTo>
+                  <a:lnTo>
+                    <a:pt x="246" y="772"/>
+                  </a:lnTo>
+                  <a:lnTo>
+                    <a:pt x="238" y="796"/>
+                  </a:lnTo>
+                  <a:lnTo>
+                    <a:pt x="230" y="820"/>
+                  </a:lnTo>
+                  <a:lnTo>
+                    <a:pt x="220" y="840"/>
+                  </a:lnTo>
+                  <a:lnTo>
+                    <a:pt x="210" y="858"/>
+                  </a:lnTo>
+                  <a:lnTo>
+                    <a:pt x="200" y="872"/>
+                  </a:lnTo>
+                  <a:lnTo>
+                    <a:pt x="188" y="884"/>
+                  </a:lnTo>
+                  <a:lnTo>
+                    <a:pt x="176" y="892"/>
+                  </a:lnTo>
+                  <a:lnTo>
+                    <a:pt x="164" y="898"/>
+                  </a:lnTo>
+                  <a:lnTo>
+                    <a:pt x="164" y="898"/>
+                  </a:lnTo>
+                  <a:lnTo>
+                    <a:pt x="152" y="892"/>
+                  </a:lnTo>
+                  <a:lnTo>
+                    <a:pt x="140" y="884"/>
+                  </a:lnTo>
+                  <a:lnTo>
+                    <a:pt x="128" y="872"/>
+                  </a:lnTo>
+                  <a:lnTo>
+                    <a:pt x="118" y="858"/>
+                  </a:lnTo>
+                  <a:lnTo>
+                    <a:pt x="108" y="840"/>
+                  </a:lnTo>
+                  <a:lnTo>
+                    <a:pt x="98" y="820"/>
+                  </a:lnTo>
+                  <a:lnTo>
+                    <a:pt x="88" y="796"/>
+                  </a:lnTo>
+                  <a:lnTo>
+                    <a:pt x="80" y="772"/>
+                  </a:lnTo>
+                  <a:lnTo>
+                    <a:pt x="72" y="744"/>
+                  </a:lnTo>
+                  <a:lnTo>
+                    <a:pt x="66" y="714"/>
+                  </a:lnTo>
+                  <a:lnTo>
+                    <a:pt x="60" y="682"/>
+                  </a:lnTo>
+                  <a:lnTo>
+                    <a:pt x="54" y="648"/>
+                  </a:lnTo>
+                  <a:lnTo>
+                    <a:pt x="50" y="614"/>
+                  </a:lnTo>
+                  <a:lnTo>
+                    <a:pt x="48" y="578"/>
+                  </a:lnTo>
+                  <a:lnTo>
+                    <a:pt x="46" y="540"/>
+                  </a:lnTo>
+                  <a:lnTo>
+                    <a:pt x="44" y="502"/>
+                  </a:lnTo>
+                  <a:lnTo>
+                    <a:pt x="44" y="502"/>
+                  </a:lnTo>
+                  <a:close/>
+                </a:path>
+              </a:pathLst>
+            </a:custGeom>
+            <a:solidFill>
+              <a:schemeClr val="tx2">
+                <a:lumMod val="40000"/>
+                <a:lumOff val="60000"/>
+              </a:schemeClr>
+            </a:solidFill>
+            <a:ln w="9525">
+              <a:noFill/>
+              <a:round/>
+              <a:headEnd/>
+              <a:tailEnd/>
+            </a:ln>
+          </p:spPr>
+          <p:txBody>
+            <a:bodyPr vert="horz" wrap="square" lIns="91440" tIns="45720" rIns="91440" bIns="45720" numCol="1" anchor="t" anchorCtr="0" compatLnSpc="1">
+              <a:prstTxWarp prst="textNoShape">
+                <a:avLst/>
+              </a:prstTxWarp>
+            </a:bodyPr>
+            <a:lstStyle/>
+            <a:p>
+              <a:endParaRPr lang="en-US"/>
+            </a:p>
+          </p:txBody>
+        </p:sp>
+        <p:sp>
+          <p:nvSpPr>
+            <p:cNvPr id="5" name="Rectangle 4"/>
+            <p:cNvSpPr/>
+            <p:nvPr/>
+          </p:nvSpPr>
+          <p:spPr>
+            <a:xfrm rot="17085561">
+              <a:off x="500261" y="1946254"/>
+              <a:ext cx="2816451" cy="337352"/>
+            </a:xfrm>
+            <a:prstGeom prst="rect">
+              <a:avLst/>
+            </a:prstGeom>
+            <a:solidFill>
+              <a:schemeClr val="bg1"/>
+            </a:solidFill>
+            <a:ln>
+              <a:noFill/>
+            </a:ln>
+          </p:spPr>
+          <p:style>
+            <a:lnRef idx="2">
+              <a:schemeClr val="accent1">
+                <a:shade val="50000"/>
+              </a:schemeClr>
+            </a:lnRef>
+            <a:fillRef idx="1">
+              <a:schemeClr val="accent1"/>
+            </a:fillRef>
+            <a:effectRef idx="0">
+              <a:schemeClr val="accent1"/>
+            </a:effectRef>
+            <a:fontRef idx="minor">
+              <a:schemeClr val="lt1"/>
+            </a:fontRef>
+          </p:style>
+          <p:txBody>
+            <a:bodyPr rtlCol="0" anchor="ctr"/>
+            <a:lstStyle/>
+            <a:p>
+              <a:pPr algn="ctr"/>
+              <a:endParaRPr lang="en-US"/>
+            </a:p>
+          </p:txBody>
+        </p:sp>
+        <p:sp>
+          <p:nvSpPr>
+            <p:cNvPr id="6" name="Rectangle 5"/>
+            <p:cNvSpPr/>
+            <p:nvPr/>
+          </p:nvSpPr>
+          <p:spPr>
+            <a:xfrm rot="1012532">
+              <a:off x="1255726" y="1919300"/>
+              <a:ext cx="1166695" cy="373066"/>
+            </a:xfrm>
+            <a:prstGeom prst="rect">
+              <a:avLst/>
+            </a:prstGeom>
+            <a:solidFill>
+              <a:schemeClr val="tx2">
+                <a:lumMod val="40000"/>
+                <a:lumOff val="60000"/>
+              </a:schemeClr>
+            </a:solidFill>
+            <a:ln>
+              <a:noFill/>
+            </a:ln>
+          </p:spPr>
+          <p:style>
+            <a:lnRef idx="2">
+              <a:schemeClr val="accent1">
+                <a:shade val="50000"/>
+              </a:schemeClr>
+            </a:lnRef>
+            <a:fillRef idx="1">
+              <a:schemeClr val="accent1"/>
+            </a:fillRef>
+            <a:effectRef idx="0">
+              <a:schemeClr val="accent1"/>
+            </a:effectRef>
+            <a:fontRef idx="minor">
+              <a:schemeClr val="lt1"/>
+            </a:fontRef>
+          </p:style>
+          <p:txBody>
+            <a:bodyPr rtlCol="0" anchor="ctr"/>
+            <a:lstStyle/>
+            <a:p>
+              <a:pPr algn="ctr"/>
+              <a:endParaRPr lang="en-US"/>
+            </a:p>
+          </p:txBody>
+        </p:sp>
+      </p:grpSp>
+    </p:spTree>
+  </p:cSld>
+  <p:clrMapOvr>
+    <a:masterClrMapping/>
+  </p:clrMapOvr>
+</p:sld>
+</file>
+
 <file path=ppt/theme/theme1.xml><?xml version="1.0" encoding="utf-8"?>
 <a:theme xmlns:a="http://schemas.openxmlformats.org/drawingml/2006/main" name="Office Theme">
   <a:themeElements>

</xml_diff>

<commit_message>
Added the base code to change pipeline speed when running in the editor
</commit_message>
<xml_diff>
--- a/Resources/Hoop-Graphics.pptx
+++ b/Resources/Hoop-Graphics.pptx
@@ -291,7 +291,7 @@
             <a:fld id="{2CCE3EF9-71E5-4228-A448-CBA7515D943E}" type="datetimeFigureOut">
               <a:rPr lang="en-US" smtClean="0"/>
               <a:pPr/>
-              <a:t>8/17/2012</a:t>
+              <a:t>4/3/2013</a:t>
             </a:fld>
             <a:endParaRPr lang="en-US"/>
           </a:p>
@@ -458,7 +458,7 @@
             <a:fld id="{2CCE3EF9-71E5-4228-A448-CBA7515D943E}" type="datetimeFigureOut">
               <a:rPr lang="en-US" smtClean="0"/>
               <a:pPr/>
-              <a:t>8/17/2012</a:t>
+              <a:t>4/3/2013</a:t>
             </a:fld>
             <a:endParaRPr lang="en-US"/>
           </a:p>
@@ -635,7 +635,7 @@
             <a:fld id="{2CCE3EF9-71E5-4228-A448-CBA7515D943E}" type="datetimeFigureOut">
               <a:rPr lang="en-US" smtClean="0"/>
               <a:pPr/>
-              <a:t>8/17/2012</a:t>
+              <a:t>4/3/2013</a:t>
             </a:fld>
             <a:endParaRPr lang="en-US"/>
           </a:p>
@@ -802,7 +802,7 @@
             <a:fld id="{2CCE3EF9-71E5-4228-A448-CBA7515D943E}" type="datetimeFigureOut">
               <a:rPr lang="en-US" smtClean="0"/>
               <a:pPr/>
-              <a:t>8/17/2012</a:t>
+              <a:t>4/3/2013</a:t>
             </a:fld>
             <a:endParaRPr lang="en-US"/>
           </a:p>
@@ -1045,7 +1045,7 @@
             <a:fld id="{2CCE3EF9-71E5-4228-A448-CBA7515D943E}" type="datetimeFigureOut">
               <a:rPr lang="en-US" smtClean="0"/>
               <a:pPr/>
-              <a:t>8/17/2012</a:t>
+              <a:t>4/3/2013</a:t>
             </a:fld>
             <a:endParaRPr lang="en-US"/>
           </a:p>
@@ -1330,7 +1330,7 @@
             <a:fld id="{2CCE3EF9-71E5-4228-A448-CBA7515D943E}" type="datetimeFigureOut">
               <a:rPr lang="en-US" smtClean="0"/>
               <a:pPr/>
-              <a:t>8/17/2012</a:t>
+              <a:t>4/3/2013</a:t>
             </a:fld>
             <a:endParaRPr lang="en-US"/>
           </a:p>
@@ -1749,7 +1749,7 @@
             <a:fld id="{2CCE3EF9-71E5-4228-A448-CBA7515D943E}" type="datetimeFigureOut">
               <a:rPr lang="en-US" smtClean="0"/>
               <a:pPr/>
-              <a:t>8/17/2012</a:t>
+              <a:t>4/3/2013</a:t>
             </a:fld>
             <a:endParaRPr lang="en-US"/>
           </a:p>
@@ -1864,7 +1864,7 @@
             <a:fld id="{2CCE3EF9-71E5-4228-A448-CBA7515D943E}" type="datetimeFigureOut">
               <a:rPr lang="en-US" smtClean="0"/>
               <a:pPr/>
-              <a:t>8/17/2012</a:t>
+              <a:t>4/3/2013</a:t>
             </a:fld>
             <a:endParaRPr lang="en-US"/>
           </a:p>
@@ -1956,7 +1956,7 @@
             <a:fld id="{2CCE3EF9-71E5-4228-A448-CBA7515D943E}" type="datetimeFigureOut">
               <a:rPr lang="en-US" smtClean="0"/>
               <a:pPr/>
-              <a:t>8/17/2012</a:t>
+              <a:t>4/3/2013</a:t>
             </a:fld>
             <a:endParaRPr lang="en-US"/>
           </a:p>
@@ -2230,7 +2230,7 @@
             <a:fld id="{2CCE3EF9-71E5-4228-A448-CBA7515D943E}" type="datetimeFigureOut">
               <a:rPr lang="en-US" smtClean="0"/>
               <a:pPr/>
-              <a:t>8/17/2012</a:t>
+              <a:t>4/3/2013</a:t>
             </a:fld>
             <a:endParaRPr lang="en-US"/>
           </a:p>
@@ -2480,7 +2480,7 @@
             <a:fld id="{2CCE3EF9-71E5-4228-A448-CBA7515D943E}" type="datetimeFigureOut">
               <a:rPr lang="en-US" smtClean="0"/>
               <a:pPr/>
-              <a:t>8/17/2012</a:t>
+              <a:t>4/3/2013</a:t>
             </a:fld>
             <a:endParaRPr lang="en-US"/>
           </a:p>
@@ -2690,7 +2690,7 @@
             <a:fld id="{2CCE3EF9-71E5-4228-A448-CBA7515D943E}" type="datetimeFigureOut">
               <a:rPr lang="en-US" smtClean="0"/>
               <a:pPr/>
-              <a:t>8/17/2012</a:t>
+              <a:t>4/3/2013</a:t>
             </a:fld>
             <a:endParaRPr lang="en-US"/>
           </a:p>
@@ -10147,6 +10147,636 @@
           </p:txBody>
         </p:sp>
       </p:grpSp>
+      <p:grpSp>
+        <p:nvGrpSpPr>
+          <p:cNvPr id="8" name="Group 7"/>
+          <p:cNvGrpSpPr/>
+          <p:nvPr/>
+        </p:nvGrpSpPr>
+        <p:grpSpPr>
+          <a:xfrm>
+            <a:off x="1143000" y="5593671"/>
+            <a:ext cx="990600" cy="457200"/>
+            <a:chOff x="1143000" y="2362200"/>
+            <a:chExt cx="990600" cy="457200"/>
+          </a:xfrm>
+        </p:grpSpPr>
+        <p:sp>
+          <p:nvSpPr>
+            <p:cNvPr id="9" name="Rectangle 8"/>
+            <p:cNvSpPr/>
+            <p:nvPr/>
+          </p:nvSpPr>
+          <p:spPr>
+            <a:xfrm>
+              <a:off x="1143000" y="2362200"/>
+              <a:ext cx="990600" cy="457200"/>
+            </a:xfrm>
+            <a:prstGeom prst="rect">
+              <a:avLst/>
+            </a:prstGeom>
+            <a:solidFill>
+              <a:schemeClr val="bg1">
+                <a:lumMod val="85000"/>
+              </a:schemeClr>
+            </a:solidFill>
+            <a:ln>
+              <a:solidFill>
+                <a:schemeClr val="tx1">
+                  <a:lumMod val="75000"/>
+                  <a:lumOff val="25000"/>
+                </a:schemeClr>
+              </a:solidFill>
+            </a:ln>
+          </p:spPr>
+          <p:style>
+            <a:lnRef idx="2">
+              <a:schemeClr val="accent1">
+                <a:shade val="50000"/>
+              </a:schemeClr>
+            </a:lnRef>
+            <a:fillRef idx="1">
+              <a:schemeClr val="accent1"/>
+            </a:fillRef>
+            <a:effectRef idx="0">
+              <a:schemeClr val="accent1"/>
+            </a:effectRef>
+            <a:fontRef idx="minor">
+              <a:schemeClr val="lt1"/>
+            </a:fontRef>
+          </p:style>
+          <p:txBody>
+            <a:bodyPr rtlCol="0" anchor="ctr"/>
+            <a:lstStyle/>
+            <a:p>
+              <a:pPr algn="ctr"/>
+              <a:endParaRPr lang="en-US"/>
+            </a:p>
+          </p:txBody>
+        </p:sp>
+        <p:sp>
+          <p:nvSpPr>
+            <p:cNvPr id="10" name="Isosceles Triangle 9"/>
+            <p:cNvSpPr/>
+            <p:nvPr/>
+          </p:nvSpPr>
+          <p:spPr>
+            <a:xfrm rot="5400000">
+              <a:off x="1193800" y="2463800"/>
+              <a:ext cx="304800" cy="254000"/>
+            </a:xfrm>
+            <a:prstGeom prst="triangle">
+              <a:avLst/>
+            </a:prstGeom>
+            <a:solidFill>
+              <a:schemeClr val="tx1"/>
+            </a:solidFill>
+            <a:ln>
+              <a:solidFill>
+                <a:schemeClr val="tx1"/>
+              </a:solidFill>
+            </a:ln>
+          </p:spPr>
+          <p:style>
+            <a:lnRef idx="2">
+              <a:schemeClr val="accent1">
+                <a:shade val="50000"/>
+              </a:schemeClr>
+            </a:lnRef>
+            <a:fillRef idx="1">
+              <a:schemeClr val="accent1"/>
+            </a:fillRef>
+            <a:effectRef idx="0">
+              <a:schemeClr val="accent1"/>
+            </a:effectRef>
+            <a:fontRef idx="minor">
+              <a:schemeClr val="lt1"/>
+            </a:fontRef>
+          </p:style>
+          <p:txBody>
+            <a:bodyPr rtlCol="0" anchor="ctr"/>
+            <a:lstStyle/>
+            <a:p>
+              <a:pPr algn="ctr"/>
+              <a:endParaRPr lang="en-US"/>
+            </a:p>
+          </p:txBody>
+        </p:sp>
+        <p:sp>
+          <p:nvSpPr>
+            <p:cNvPr id="11" name="Isosceles Triangle 10"/>
+            <p:cNvSpPr/>
+            <p:nvPr/>
+          </p:nvSpPr>
+          <p:spPr>
+            <a:xfrm rot="5400000">
+              <a:off x="1498600" y="2463800"/>
+              <a:ext cx="304800" cy="254000"/>
+            </a:xfrm>
+            <a:prstGeom prst="triangle">
+              <a:avLst/>
+            </a:prstGeom>
+            <a:solidFill>
+              <a:schemeClr val="tx1"/>
+            </a:solidFill>
+            <a:ln>
+              <a:solidFill>
+                <a:schemeClr val="tx1"/>
+              </a:solidFill>
+            </a:ln>
+          </p:spPr>
+          <p:style>
+            <a:lnRef idx="2">
+              <a:schemeClr val="accent1">
+                <a:shade val="50000"/>
+              </a:schemeClr>
+            </a:lnRef>
+            <a:fillRef idx="1">
+              <a:schemeClr val="accent1"/>
+            </a:fillRef>
+            <a:effectRef idx="0">
+              <a:schemeClr val="accent1"/>
+            </a:effectRef>
+            <a:fontRef idx="minor">
+              <a:schemeClr val="lt1"/>
+            </a:fontRef>
+          </p:style>
+          <p:txBody>
+            <a:bodyPr rtlCol="0" anchor="ctr"/>
+            <a:lstStyle/>
+            <a:p>
+              <a:pPr algn="ctr"/>
+              <a:endParaRPr lang="en-US"/>
+            </a:p>
+          </p:txBody>
+        </p:sp>
+        <p:sp>
+          <p:nvSpPr>
+            <p:cNvPr id="12" name="Isosceles Triangle 11"/>
+            <p:cNvSpPr/>
+            <p:nvPr/>
+          </p:nvSpPr>
+          <p:spPr>
+            <a:xfrm rot="5400000">
+              <a:off x="1803400" y="2463800"/>
+              <a:ext cx="304800" cy="254000"/>
+            </a:xfrm>
+            <a:prstGeom prst="triangle">
+              <a:avLst/>
+            </a:prstGeom>
+            <a:solidFill>
+              <a:schemeClr val="tx1"/>
+            </a:solidFill>
+            <a:ln>
+              <a:solidFill>
+                <a:schemeClr val="tx1"/>
+              </a:solidFill>
+            </a:ln>
+          </p:spPr>
+          <p:style>
+            <a:lnRef idx="2">
+              <a:schemeClr val="accent1">
+                <a:shade val="50000"/>
+              </a:schemeClr>
+            </a:lnRef>
+            <a:fillRef idx="1">
+              <a:schemeClr val="accent1"/>
+            </a:fillRef>
+            <a:effectRef idx="0">
+              <a:schemeClr val="accent1"/>
+            </a:effectRef>
+            <a:fontRef idx="minor">
+              <a:schemeClr val="lt1"/>
+            </a:fontRef>
+          </p:style>
+          <p:txBody>
+            <a:bodyPr rtlCol="0" anchor="ctr"/>
+            <a:lstStyle/>
+            <a:p>
+              <a:pPr algn="ctr"/>
+              <a:endParaRPr lang="en-US"/>
+            </a:p>
+          </p:txBody>
+        </p:sp>
+      </p:grpSp>
+      <p:grpSp>
+        <p:nvGrpSpPr>
+          <p:cNvPr id="13" name="Group 12"/>
+          <p:cNvGrpSpPr/>
+          <p:nvPr/>
+        </p:nvGrpSpPr>
+        <p:grpSpPr>
+          <a:xfrm>
+            <a:off x="1143000" y="4374471"/>
+            <a:ext cx="990600" cy="457200"/>
+            <a:chOff x="1143000" y="2971800"/>
+            <a:chExt cx="990600" cy="457200"/>
+          </a:xfrm>
+        </p:grpSpPr>
+        <p:sp>
+          <p:nvSpPr>
+            <p:cNvPr id="14" name="Rectangle 13"/>
+            <p:cNvSpPr/>
+            <p:nvPr/>
+          </p:nvSpPr>
+          <p:spPr>
+            <a:xfrm>
+              <a:off x="1143000" y="2971800"/>
+              <a:ext cx="990600" cy="457200"/>
+            </a:xfrm>
+            <a:prstGeom prst="rect">
+              <a:avLst/>
+            </a:prstGeom>
+            <a:solidFill>
+              <a:schemeClr val="bg1">
+                <a:lumMod val="85000"/>
+              </a:schemeClr>
+            </a:solidFill>
+            <a:ln>
+              <a:solidFill>
+                <a:schemeClr val="tx1">
+                  <a:lumMod val="75000"/>
+                  <a:lumOff val="25000"/>
+                </a:schemeClr>
+              </a:solidFill>
+            </a:ln>
+          </p:spPr>
+          <p:style>
+            <a:lnRef idx="2">
+              <a:schemeClr val="accent1">
+                <a:shade val="50000"/>
+              </a:schemeClr>
+            </a:lnRef>
+            <a:fillRef idx="1">
+              <a:schemeClr val="accent1"/>
+            </a:fillRef>
+            <a:effectRef idx="0">
+              <a:schemeClr val="accent1"/>
+            </a:effectRef>
+            <a:fontRef idx="minor">
+              <a:schemeClr val="lt1"/>
+            </a:fontRef>
+          </p:style>
+          <p:txBody>
+            <a:bodyPr rtlCol="0" anchor="ctr"/>
+            <a:lstStyle/>
+            <a:p>
+              <a:pPr algn="ctr"/>
+              <a:endParaRPr lang="en-US"/>
+            </a:p>
+          </p:txBody>
+        </p:sp>
+        <p:sp>
+          <p:nvSpPr>
+            <p:cNvPr id="15" name="Isosceles Triangle 14"/>
+            <p:cNvSpPr/>
+            <p:nvPr/>
+          </p:nvSpPr>
+          <p:spPr>
+            <a:xfrm rot="5400000">
+              <a:off x="1193800" y="3073400"/>
+              <a:ext cx="304800" cy="254000"/>
+            </a:xfrm>
+            <a:prstGeom prst="triangle">
+              <a:avLst/>
+            </a:prstGeom>
+            <a:solidFill>
+              <a:schemeClr val="tx1"/>
+            </a:solidFill>
+            <a:ln>
+              <a:solidFill>
+                <a:schemeClr val="tx1"/>
+              </a:solidFill>
+            </a:ln>
+          </p:spPr>
+          <p:style>
+            <a:lnRef idx="2">
+              <a:schemeClr val="accent1">
+                <a:shade val="50000"/>
+              </a:schemeClr>
+            </a:lnRef>
+            <a:fillRef idx="1">
+              <a:schemeClr val="accent1"/>
+            </a:fillRef>
+            <a:effectRef idx="0">
+              <a:schemeClr val="accent1"/>
+            </a:effectRef>
+            <a:fontRef idx="minor">
+              <a:schemeClr val="lt1"/>
+            </a:fontRef>
+          </p:style>
+          <p:txBody>
+            <a:bodyPr rtlCol="0" anchor="ctr"/>
+            <a:lstStyle/>
+            <a:p>
+              <a:pPr algn="ctr"/>
+              <a:endParaRPr lang="en-US"/>
+            </a:p>
+          </p:txBody>
+        </p:sp>
+        <p:sp>
+          <p:nvSpPr>
+            <p:cNvPr id="16" name="Isosceles Triangle 15"/>
+            <p:cNvSpPr/>
+            <p:nvPr/>
+          </p:nvSpPr>
+          <p:spPr>
+            <a:xfrm rot="5400000">
+              <a:off x="1498600" y="3073400"/>
+              <a:ext cx="304800" cy="254000"/>
+            </a:xfrm>
+            <a:prstGeom prst="triangle">
+              <a:avLst/>
+            </a:prstGeom>
+            <a:noFill/>
+            <a:ln>
+              <a:solidFill>
+                <a:schemeClr val="tx1"/>
+              </a:solidFill>
+            </a:ln>
+          </p:spPr>
+          <p:style>
+            <a:lnRef idx="2">
+              <a:schemeClr val="accent1">
+                <a:shade val="50000"/>
+              </a:schemeClr>
+            </a:lnRef>
+            <a:fillRef idx="1">
+              <a:schemeClr val="accent1"/>
+            </a:fillRef>
+            <a:effectRef idx="0">
+              <a:schemeClr val="accent1"/>
+            </a:effectRef>
+            <a:fontRef idx="minor">
+              <a:schemeClr val="lt1"/>
+            </a:fontRef>
+          </p:style>
+          <p:txBody>
+            <a:bodyPr rtlCol="0" anchor="ctr"/>
+            <a:lstStyle/>
+            <a:p>
+              <a:pPr algn="ctr"/>
+              <a:endParaRPr lang="en-US"/>
+            </a:p>
+          </p:txBody>
+        </p:sp>
+        <p:sp>
+          <p:nvSpPr>
+            <p:cNvPr id="17" name="Isosceles Triangle 16"/>
+            <p:cNvSpPr/>
+            <p:nvPr/>
+          </p:nvSpPr>
+          <p:spPr>
+            <a:xfrm rot="5400000">
+              <a:off x="1803400" y="3073400"/>
+              <a:ext cx="304800" cy="254000"/>
+            </a:xfrm>
+            <a:prstGeom prst="triangle">
+              <a:avLst/>
+            </a:prstGeom>
+            <a:noFill/>
+            <a:ln>
+              <a:solidFill>
+                <a:schemeClr val="tx1"/>
+              </a:solidFill>
+            </a:ln>
+          </p:spPr>
+          <p:style>
+            <a:lnRef idx="2">
+              <a:schemeClr val="accent1">
+                <a:shade val="50000"/>
+              </a:schemeClr>
+            </a:lnRef>
+            <a:fillRef idx="1">
+              <a:schemeClr val="accent1"/>
+            </a:fillRef>
+            <a:effectRef idx="0">
+              <a:schemeClr val="accent1"/>
+            </a:effectRef>
+            <a:fontRef idx="minor">
+              <a:schemeClr val="lt1"/>
+            </a:fontRef>
+          </p:style>
+          <p:txBody>
+            <a:bodyPr rtlCol="0" anchor="ctr"/>
+            <a:lstStyle/>
+            <a:p>
+              <a:pPr algn="ctr"/>
+              <a:endParaRPr lang="en-US"/>
+            </a:p>
+          </p:txBody>
+        </p:sp>
+      </p:grpSp>
+      <p:grpSp>
+        <p:nvGrpSpPr>
+          <p:cNvPr id="18" name="Group 17"/>
+          <p:cNvGrpSpPr/>
+          <p:nvPr/>
+        </p:nvGrpSpPr>
+        <p:grpSpPr>
+          <a:xfrm>
+            <a:off x="1143000" y="4984071"/>
+            <a:ext cx="990600" cy="457200"/>
+            <a:chOff x="1143000" y="3581400"/>
+            <a:chExt cx="990600" cy="457200"/>
+          </a:xfrm>
+        </p:grpSpPr>
+        <p:sp>
+          <p:nvSpPr>
+            <p:cNvPr id="19" name="Rectangle 18"/>
+            <p:cNvSpPr/>
+            <p:nvPr/>
+          </p:nvSpPr>
+          <p:spPr>
+            <a:xfrm>
+              <a:off x="1143000" y="3581400"/>
+              <a:ext cx="990600" cy="457200"/>
+            </a:xfrm>
+            <a:prstGeom prst="rect">
+              <a:avLst/>
+            </a:prstGeom>
+            <a:solidFill>
+              <a:schemeClr val="bg1">
+                <a:lumMod val="85000"/>
+              </a:schemeClr>
+            </a:solidFill>
+            <a:ln>
+              <a:solidFill>
+                <a:schemeClr val="tx1">
+                  <a:lumMod val="75000"/>
+                  <a:lumOff val="25000"/>
+                </a:schemeClr>
+              </a:solidFill>
+            </a:ln>
+          </p:spPr>
+          <p:style>
+            <a:lnRef idx="2">
+              <a:schemeClr val="accent1">
+                <a:shade val="50000"/>
+              </a:schemeClr>
+            </a:lnRef>
+            <a:fillRef idx="1">
+              <a:schemeClr val="accent1"/>
+            </a:fillRef>
+            <a:effectRef idx="0">
+              <a:schemeClr val="accent1"/>
+            </a:effectRef>
+            <a:fontRef idx="minor">
+              <a:schemeClr val="lt1"/>
+            </a:fontRef>
+          </p:style>
+          <p:txBody>
+            <a:bodyPr rtlCol="0" anchor="ctr"/>
+            <a:lstStyle/>
+            <a:p>
+              <a:pPr algn="ctr"/>
+              <a:endParaRPr lang="en-US"/>
+            </a:p>
+          </p:txBody>
+        </p:sp>
+        <p:sp>
+          <p:nvSpPr>
+            <p:cNvPr id="20" name="Isosceles Triangle 19"/>
+            <p:cNvSpPr/>
+            <p:nvPr/>
+          </p:nvSpPr>
+          <p:spPr>
+            <a:xfrm rot="5400000">
+              <a:off x="1193800" y="3683000"/>
+              <a:ext cx="304800" cy="254000"/>
+            </a:xfrm>
+            <a:prstGeom prst="triangle">
+              <a:avLst/>
+            </a:prstGeom>
+            <a:solidFill>
+              <a:schemeClr val="tx1"/>
+            </a:solidFill>
+            <a:ln>
+              <a:solidFill>
+                <a:schemeClr val="tx1"/>
+              </a:solidFill>
+            </a:ln>
+          </p:spPr>
+          <p:style>
+            <a:lnRef idx="2">
+              <a:schemeClr val="accent1">
+                <a:shade val="50000"/>
+              </a:schemeClr>
+            </a:lnRef>
+            <a:fillRef idx="1">
+              <a:schemeClr val="accent1"/>
+            </a:fillRef>
+            <a:effectRef idx="0">
+              <a:schemeClr val="accent1"/>
+            </a:effectRef>
+            <a:fontRef idx="minor">
+              <a:schemeClr val="lt1"/>
+            </a:fontRef>
+          </p:style>
+          <p:txBody>
+            <a:bodyPr rtlCol="0" anchor="ctr"/>
+            <a:lstStyle/>
+            <a:p>
+              <a:pPr algn="ctr"/>
+              <a:endParaRPr lang="en-US"/>
+            </a:p>
+          </p:txBody>
+        </p:sp>
+        <p:sp>
+          <p:nvSpPr>
+            <p:cNvPr id="21" name="Isosceles Triangle 20"/>
+            <p:cNvSpPr/>
+            <p:nvPr/>
+          </p:nvSpPr>
+          <p:spPr>
+            <a:xfrm rot="5400000">
+              <a:off x="1498600" y="3683000"/>
+              <a:ext cx="304800" cy="254000"/>
+            </a:xfrm>
+            <a:prstGeom prst="triangle">
+              <a:avLst/>
+            </a:prstGeom>
+            <a:solidFill>
+              <a:schemeClr val="tx1"/>
+            </a:solidFill>
+            <a:ln>
+              <a:solidFill>
+                <a:schemeClr val="tx1"/>
+              </a:solidFill>
+            </a:ln>
+          </p:spPr>
+          <p:style>
+            <a:lnRef idx="2">
+              <a:schemeClr val="accent1">
+                <a:shade val="50000"/>
+              </a:schemeClr>
+            </a:lnRef>
+            <a:fillRef idx="1">
+              <a:schemeClr val="accent1"/>
+            </a:fillRef>
+            <a:effectRef idx="0">
+              <a:schemeClr val="accent1"/>
+            </a:effectRef>
+            <a:fontRef idx="minor">
+              <a:schemeClr val="lt1"/>
+            </a:fontRef>
+          </p:style>
+          <p:txBody>
+            <a:bodyPr rtlCol="0" anchor="ctr"/>
+            <a:lstStyle/>
+            <a:p>
+              <a:pPr algn="ctr"/>
+              <a:endParaRPr lang="en-US"/>
+            </a:p>
+          </p:txBody>
+        </p:sp>
+        <p:sp>
+          <p:nvSpPr>
+            <p:cNvPr id="22" name="Isosceles Triangle 21"/>
+            <p:cNvSpPr/>
+            <p:nvPr/>
+          </p:nvSpPr>
+          <p:spPr>
+            <a:xfrm rot="5400000">
+              <a:off x="1803400" y="3683000"/>
+              <a:ext cx="304800" cy="254000"/>
+            </a:xfrm>
+            <a:prstGeom prst="triangle">
+              <a:avLst/>
+            </a:prstGeom>
+            <a:noFill/>
+            <a:ln>
+              <a:solidFill>
+                <a:schemeClr val="tx1"/>
+              </a:solidFill>
+            </a:ln>
+          </p:spPr>
+          <p:style>
+            <a:lnRef idx="2">
+              <a:schemeClr val="accent1">
+                <a:shade val="50000"/>
+              </a:schemeClr>
+            </a:lnRef>
+            <a:fillRef idx="1">
+              <a:schemeClr val="accent1"/>
+            </a:fillRef>
+            <a:effectRef idx="0">
+              <a:schemeClr val="accent1"/>
+            </a:effectRef>
+            <a:fontRef idx="minor">
+              <a:schemeClr val="lt1"/>
+            </a:fontRef>
+          </p:style>
+          <p:txBody>
+            <a:bodyPr rtlCol="0" anchor="ctr"/>
+            <a:lstStyle/>
+            <a:p>
+              <a:pPr algn="ctr"/>
+              <a:endParaRPr lang="en-US"/>
+            </a:p>
+          </p:txBody>
+        </p:sp>
+      </p:grpSp>
     </p:spTree>
   </p:cSld>
   <p:clrMapOvr>

</xml_diff>

<commit_message>
Small adjustments to the hoop coloring
</commit_message>
<xml_diff>
--- a/Resources/Hoop-Graphics.pptx
+++ b/Resources/Hoop-Graphics.pptx
@@ -292,7 +292,7 @@
             <a:fld id="{2CCE3EF9-71E5-4228-A448-CBA7515D943E}" type="datetimeFigureOut">
               <a:rPr lang="en-US" smtClean="0"/>
               <a:pPr/>
-              <a:t>5/2/2013</a:t>
+              <a:t>5/3/2013</a:t>
             </a:fld>
             <a:endParaRPr lang="en-US"/>
           </a:p>
@@ -459,7 +459,7 @@
             <a:fld id="{2CCE3EF9-71E5-4228-A448-CBA7515D943E}" type="datetimeFigureOut">
               <a:rPr lang="en-US" smtClean="0"/>
               <a:pPr/>
-              <a:t>5/2/2013</a:t>
+              <a:t>5/3/2013</a:t>
             </a:fld>
             <a:endParaRPr lang="en-US"/>
           </a:p>
@@ -636,7 +636,7 @@
             <a:fld id="{2CCE3EF9-71E5-4228-A448-CBA7515D943E}" type="datetimeFigureOut">
               <a:rPr lang="en-US" smtClean="0"/>
               <a:pPr/>
-              <a:t>5/2/2013</a:t>
+              <a:t>5/3/2013</a:t>
             </a:fld>
             <a:endParaRPr lang="en-US"/>
           </a:p>
@@ -803,7 +803,7 @@
             <a:fld id="{2CCE3EF9-71E5-4228-A448-CBA7515D943E}" type="datetimeFigureOut">
               <a:rPr lang="en-US" smtClean="0"/>
               <a:pPr/>
-              <a:t>5/2/2013</a:t>
+              <a:t>5/3/2013</a:t>
             </a:fld>
             <a:endParaRPr lang="en-US"/>
           </a:p>
@@ -1046,7 +1046,7 @@
             <a:fld id="{2CCE3EF9-71E5-4228-A448-CBA7515D943E}" type="datetimeFigureOut">
               <a:rPr lang="en-US" smtClean="0"/>
               <a:pPr/>
-              <a:t>5/2/2013</a:t>
+              <a:t>5/3/2013</a:t>
             </a:fld>
             <a:endParaRPr lang="en-US"/>
           </a:p>
@@ -1331,7 +1331,7 @@
             <a:fld id="{2CCE3EF9-71E5-4228-A448-CBA7515D943E}" type="datetimeFigureOut">
               <a:rPr lang="en-US" smtClean="0"/>
               <a:pPr/>
-              <a:t>5/2/2013</a:t>
+              <a:t>5/3/2013</a:t>
             </a:fld>
             <a:endParaRPr lang="en-US"/>
           </a:p>
@@ -1750,7 +1750,7 @@
             <a:fld id="{2CCE3EF9-71E5-4228-A448-CBA7515D943E}" type="datetimeFigureOut">
               <a:rPr lang="en-US" smtClean="0"/>
               <a:pPr/>
-              <a:t>5/2/2013</a:t>
+              <a:t>5/3/2013</a:t>
             </a:fld>
             <a:endParaRPr lang="en-US"/>
           </a:p>
@@ -1865,7 +1865,7 @@
             <a:fld id="{2CCE3EF9-71E5-4228-A448-CBA7515D943E}" type="datetimeFigureOut">
               <a:rPr lang="en-US" smtClean="0"/>
               <a:pPr/>
-              <a:t>5/2/2013</a:t>
+              <a:t>5/3/2013</a:t>
             </a:fld>
             <a:endParaRPr lang="en-US"/>
           </a:p>
@@ -1957,7 +1957,7 @@
             <a:fld id="{2CCE3EF9-71E5-4228-A448-CBA7515D943E}" type="datetimeFigureOut">
               <a:rPr lang="en-US" smtClean="0"/>
               <a:pPr/>
-              <a:t>5/2/2013</a:t>
+              <a:t>5/3/2013</a:t>
             </a:fld>
             <a:endParaRPr lang="en-US"/>
           </a:p>
@@ -2231,7 +2231,7 @@
             <a:fld id="{2CCE3EF9-71E5-4228-A448-CBA7515D943E}" type="datetimeFigureOut">
               <a:rPr lang="en-US" smtClean="0"/>
               <a:pPr/>
-              <a:t>5/2/2013</a:t>
+              <a:t>5/3/2013</a:t>
             </a:fld>
             <a:endParaRPr lang="en-US"/>
           </a:p>
@@ -2481,7 +2481,7 @@
             <a:fld id="{2CCE3EF9-71E5-4228-A448-CBA7515D943E}" type="datetimeFigureOut">
               <a:rPr lang="en-US" smtClean="0"/>
               <a:pPr/>
-              <a:t>5/2/2013</a:t>
+              <a:t>5/3/2013</a:t>
             </a:fld>
             <a:endParaRPr lang="en-US"/>
           </a:p>
@@ -2691,7 +2691,7 @@
             <a:fld id="{2CCE3EF9-71E5-4228-A448-CBA7515D943E}" type="datetimeFigureOut">
               <a:rPr lang="en-US" smtClean="0"/>
               <a:pPr/>
-              <a:t>5/2/2013</a:t>
+              <a:t>5/3/2013</a:t>
             </a:fld>
             <a:endParaRPr lang="en-US"/>
           </a:p>
@@ -9419,7 +9419,7 @@
             <a:avLst/>
           </a:prstGeom>
           <a:solidFill>
-            <a:srgbClr val="FFFFCC"/>
+            <a:srgbClr val="FFFF99"/>
           </a:solidFill>
           <a:ln>
             <a:solidFill>
@@ -13650,6 +13650,596 @@
           </p:txBody>
         </p:sp>
       </p:grpSp>
+      <p:sp>
+        <p:nvSpPr>
+          <p:cNvPr id="148" name="TextBox 147"/>
+          <p:cNvSpPr txBox="1"/>
+          <p:nvPr/>
+        </p:nvSpPr>
+        <p:spPr>
+          <a:xfrm>
+            <a:off x="5257800" y="5715000"/>
+            <a:ext cx="855234" cy="369332"/>
+          </a:xfrm>
+          <a:prstGeom prst="rect">
+            <a:avLst/>
+          </a:prstGeom>
+          <a:noFill/>
+        </p:spPr>
+        <p:txBody>
+          <a:bodyPr wrap="none" rtlCol="0">
+            <a:spAutoFit/>
+          </a:bodyPr>
+          <a:lstStyle/>
+          <a:p>
+            <a:r>
+              <a:rPr lang="en-US" smtClean="0"/>
+              <a:t>Display</a:t>
+            </a:r>
+            <a:endParaRPr lang="en-US"/>
+          </a:p>
+        </p:txBody>
+      </p:sp>
+      <p:grpSp>
+        <p:nvGrpSpPr>
+          <p:cNvPr id="164" name="Group 163"/>
+          <p:cNvGrpSpPr/>
+          <p:nvPr/>
+        </p:nvGrpSpPr>
+        <p:grpSpPr>
+          <a:xfrm>
+            <a:off x="3741546" y="5556504"/>
+            <a:ext cx="1363854" cy="879908"/>
+            <a:chOff x="3741546" y="5556504"/>
+            <a:chExt cx="1363854" cy="879908"/>
+          </a:xfrm>
+        </p:grpSpPr>
+        <p:sp>
+          <p:nvSpPr>
+            <p:cNvPr id="147" name="Rectangle 146"/>
+            <p:cNvSpPr/>
+            <p:nvPr/>
+          </p:nvSpPr>
+          <p:spPr>
+            <a:xfrm>
+              <a:off x="3810000" y="5562600"/>
+              <a:ext cx="1295400" cy="838200"/>
+            </a:xfrm>
+            <a:prstGeom prst="rect">
+              <a:avLst/>
+            </a:prstGeom>
+            <a:solidFill>
+              <a:schemeClr val="bg2">
+                <a:lumMod val="75000"/>
+              </a:schemeClr>
+            </a:solidFill>
+            <a:ln>
+              <a:solidFill>
+                <a:schemeClr val="tx1"/>
+              </a:solidFill>
+            </a:ln>
+            <a:effectLst>
+              <a:outerShdw blurRad="50800" dist="38100" dir="2700000" algn="tl" rotWithShape="0">
+                <a:prstClr val="black">
+                  <a:alpha val="40000"/>
+                </a:prstClr>
+              </a:outerShdw>
+            </a:effectLst>
+            <a:scene3d>
+              <a:camera prst="orthographicFront"/>
+              <a:lightRig rig="threePt" dir="t"/>
+            </a:scene3d>
+            <a:sp3d>
+              <a:bevelT w="50800" h="50800"/>
+            </a:sp3d>
+          </p:spPr>
+          <p:style>
+            <a:lnRef idx="2">
+              <a:schemeClr val="accent1">
+                <a:shade val="50000"/>
+              </a:schemeClr>
+            </a:lnRef>
+            <a:fillRef idx="1">
+              <a:schemeClr val="accent1"/>
+            </a:fillRef>
+            <a:effectRef idx="0">
+              <a:schemeClr val="accent1"/>
+            </a:effectRef>
+            <a:fontRef idx="minor">
+              <a:schemeClr val="lt1"/>
+            </a:fontRef>
+          </p:style>
+          <p:txBody>
+            <a:bodyPr rtlCol="0" anchor="ctr"/>
+            <a:lstStyle/>
+            <a:p>
+              <a:pPr algn="ctr"/>
+              <a:endParaRPr lang="en-US"/>
+            </a:p>
+          </p:txBody>
+        </p:sp>
+        <p:grpSp>
+          <p:nvGrpSpPr>
+            <p:cNvPr id="149" name="Group 148"/>
+            <p:cNvGrpSpPr/>
+            <p:nvPr/>
+          </p:nvGrpSpPr>
+          <p:grpSpPr>
+            <a:xfrm>
+              <a:off x="3741546" y="5556504"/>
+              <a:ext cx="1342518" cy="879908"/>
+              <a:chOff x="3744594" y="600456"/>
+              <a:chExt cx="1342518" cy="879908"/>
+            </a:xfrm>
+          </p:grpSpPr>
+          <p:pic>
+            <p:nvPicPr>
+              <p:cNvPr id="150" name="Picture 149" descr="led-yellow.png"/>
+              <p:cNvPicPr>
+                <a:picLocks noChangeAspect="1"/>
+              </p:cNvPicPr>
+              <p:nvPr/>
+            </p:nvPicPr>
+            <p:blipFill>
+              <a:blip r:embed="rId2" cstate="print"/>
+              <a:stretch>
+                <a:fillRect/>
+              </a:stretch>
+            </p:blipFill>
+            <p:spPr>
+              <a:xfrm>
+                <a:off x="3828288" y="627888"/>
+                <a:ext cx="152400" cy="152400"/>
+              </a:xfrm>
+              <a:prstGeom prst="rect">
+                <a:avLst/>
+              </a:prstGeom>
+            </p:spPr>
+          </p:pic>
+          <p:pic>
+            <p:nvPicPr>
+              <p:cNvPr id="151" name="Picture 150" descr="help_icon.png"/>
+              <p:cNvPicPr>
+                <a:picLocks noChangeAspect="1"/>
+              </p:cNvPicPr>
+              <p:nvPr/>
+            </p:nvPicPr>
+            <p:blipFill>
+              <a:blip r:embed="rId3" cstate="print"/>
+              <a:stretch>
+                <a:fillRect/>
+              </a:stretch>
+            </p:blipFill>
+            <p:spPr>
+              <a:xfrm>
+                <a:off x="4934712" y="618744"/>
+                <a:ext cx="152400" cy="152400"/>
+              </a:xfrm>
+              <a:prstGeom prst="rect">
+                <a:avLst/>
+              </a:prstGeom>
+            </p:spPr>
+          </p:pic>
+          <p:pic>
+            <p:nvPicPr>
+              <p:cNvPr id="152" name="Picture 151" descr="gtk-execute.png"/>
+              <p:cNvPicPr>
+                <a:picLocks noChangeAspect="1"/>
+              </p:cNvPicPr>
+              <p:nvPr/>
+            </p:nvPicPr>
+            <p:blipFill>
+              <a:blip r:embed="rId4" cstate="print"/>
+              <a:stretch>
+                <a:fillRect/>
+              </a:stretch>
+            </p:blipFill>
+            <p:spPr>
+              <a:xfrm>
+                <a:off x="4782312" y="627888"/>
+                <a:ext cx="152400" cy="152400"/>
+              </a:xfrm>
+              <a:prstGeom prst="rect">
+                <a:avLst/>
+              </a:prstGeom>
+            </p:spPr>
+          </p:pic>
+          <p:pic>
+            <p:nvPicPr>
+              <p:cNvPr id="153" name="Picture 152" descr="zoom.png"/>
+              <p:cNvPicPr>
+                <a:picLocks noChangeAspect="1"/>
+              </p:cNvPicPr>
+              <p:nvPr/>
+            </p:nvPicPr>
+            <p:blipFill>
+              <a:blip r:embed="rId5" cstate="print"/>
+              <a:stretch>
+                <a:fillRect/>
+              </a:stretch>
+            </p:blipFill>
+            <p:spPr>
+              <a:xfrm>
+                <a:off x="4613668" y="627888"/>
+                <a:ext cx="155448" cy="155448"/>
+              </a:xfrm>
+              <a:prstGeom prst="rect">
+                <a:avLst/>
+              </a:prstGeom>
+            </p:spPr>
+          </p:pic>
+          <p:sp>
+            <p:nvSpPr>
+              <p:cNvPr id="154" name="Oval 153"/>
+              <p:cNvSpPr/>
+              <p:nvPr/>
+            </p:nvSpPr>
+            <p:spPr>
+              <a:xfrm>
+                <a:off x="4901184" y="841248"/>
+                <a:ext cx="137160" cy="137160"/>
+              </a:xfrm>
+              <a:prstGeom prst="ellipse">
+                <a:avLst/>
+              </a:prstGeom>
+              <a:solidFill>
+                <a:schemeClr val="bg1">
+                  <a:lumMod val="85000"/>
+                </a:schemeClr>
+              </a:solidFill>
+              <a:ln w="12700">
+                <a:solidFill>
+                  <a:schemeClr val="tx1"/>
+                </a:solidFill>
+              </a:ln>
+            </p:spPr>
+            <p:style>
+              <a:lnRef idx="2">
+                <a:schemeClr val="accent1">
+                  <a:shade val="50000"/>
+                </a:schemeClr>
+              </a:lnRef>
+              <a:fillRef idx="1">
+                <a:schemeClr val="accent1"/>
+              </a:fillRef>
+              <a:effectRef idx="0">
+                <a:schemeClr val="accent1"/>
+              </a:effectRef>
+              <a:fontRef idx="minor">
+                <a:schemeClr val="lt1"/>
+              </a:fontRef>
+            </p:style>
+            <p:txBody>
+              <a:bodyPr rtlCol="0" anchor="ctr"/>
+              <a:lstStyle/>
+              <a:p>
+                <a:pPr algn="ctr"/>
+                <a:endParaRPr lang="en-US"/>
+              </a:p>
+            </p:txBody>
+          </p:sp>
+          <p:cxnSp>
+            <p:nvCxnSpPr>
+              <p:cNvPr id="155" name="Straight Connector 154"/>
+              <p:cNvCxnSpPr/>
+              <p:nvPr/>
+            </p:nvCxnSpPr>
+            <p:spPr>
+              <a:xfrm>
+                <a:off x="3886200" y="801624"/>
+                <a:ext cx="1143000" cy="0"/>
+              </a:xfrm>
+              <a:prstGeom prst="line">
+                <a:avLst/>
+              </a:prstGeom>
+              <a:ln>
+                <a:solidFill>
+                  <a:schemeClr val="tx1"/>
+                </a:solidFill>
+              </a:ln>
+            </p:spPr>
+            <p:style>
+              <a:lnRef idx="1">
+                <a:schemeClr val="accent1"/>
+              </a:lnRef>
+              <a:fillRef idx="0">
+                <a:schemeClr val="accent1"/>
+              </a:fillRef>
+              <a:effectRef idx="0">
+                <a:schemeClr val="accent1"/>
+              </a:effectRef>
+              <a:fontRef idx="minor">
+                <a:schemeClr val="tx1"/>
+              </a:fontRef>
+            </p:style>
+          </p:cxnSp>
+          <p:cxnSp>
+            <p:nvCxnSpPr>
+              <p:cNvPr id="156" name="Straight Connector 155"/>
+              <p:cNvCxnSpPr/>
+              <p:nvPr/>
+            </p:nvCxnSpPr>
+            <p:spPr>
+              <a:xfrm>
+                <a:off x="3886200" y="1295400"/>
+                <a:ext cx="1143000" cy="0"/>
+              </a:xfrm>
+              <a:prstGeom prst="line">
+                <a:avLst/>
+              </a:prstGeom>
+              <a:ln>
+                <a:solidFill>
+                  <a:schemeClr val="tx1"/>
+                </a:solidFill>
+              </a:ln>
+            </p:spPr>
+            <p:style>
+              <a:lnRef idx="1">
+                <a:schemeClr val="accent1"/>
+              </a:lnRef>
+              <a:fillRef idx="0">
+                <a:schemeClr val="accent1"/>
+              </a:fillRef>
+              <a:effectRef idx="0">
+                <a:schemeClr val="accent1"/>
+              </a:effectRef>
+              <a:fontRef idx="minor">
+                <a:schemeClr val="tx1"/>
+              </a:fontRef>
+            </p:style>
+          </p:cxnSp>
+          <p:sp>
+            <p:nvSpPr>
+              <p:cNvPr id="157" name="TextBox 156"/>
+              <p:cNvSpPr txBox="1"/>
+              <p:nvPr/>
+            </p:nvSpPr>
+            <p:spPr>
+              <a:xfrm>
+                <a:off x="3744594" y="1264920"/>
+                <a:ext cx="486030" cy="215444"/>
+              </a:xfrm>
+              <a:prstGeom prst="rect">
+                <a:avLst/>
+              </a:prstGeom>
+              <a:noFill/>
+            </p:spPr>
+            <p:txBody>
+              <a:bodyPr wrap="none" rtlCol="0">
+                <a:spAutoFit/>
+              </a:bodyPr>
+              <a:lstStyle/>
+              <a:p>
+                <a:r>
+                  <a:rPr lang="en-US" sz="800" smtClean="0"/>
+                  <a:t>Ex: 0 R:</a:t>
+                </a:r>
+                <a:endParaRPr lang="en-US" sz="800"/>
+              </a:p>
+            </p:txBody>
+          </p:sp>
+          <p:sp>
+            <p:nvSpPr>
+              <p:cNvPr id="158" name="TextBox 157"/>
+              <p:cNvSpPr txBox="1"/>
+              <p:nvPr/>
+            </p:nvSpPr>
+            <p:spPr>
+              <a:xfrm>
+                <a:off x="3912009" y="600456"/>
+                <a:ext cx="614271" cy="215444"/>
+              </a:xfrm>
+              <a:prstGeom prst="rect">
+                <a:avLst/>
+              </a:prstGeom>
+              <a:noFill/>
+            </p:spPr>
+            <p:txBody>
+              <a:bodyPr wrap="none" rtlCol="0">
+                <a:spAutoFit/>
+              </a:bodyPr>
+              <a:lstStyle/>
+              <a:p>
+                <a:r>
+                  <a:rPr lang="en-US" sz="800" smtClean="0"/>
+                  <a:t>HoopLoad</a:t>
+                </a:r>
+                <a:endParaRPr lang="en-US" sz="800"/>
+              </a:p>
+            </p:txBody>
+          </p:sp>
+          <p:sp>
+            <p:nvSpPr>
+              <p:cNvPr id="159" name="Oval 158"/>
+              <p:cNvSpPr/>
+              <p:nvPr/>
+            </p:nvSpPr>
+            <p:spPr>
+              <a:xfrm>
+                <a:off x="4904232" y="1048512"/>
+                <a:ext cx="137160" cy="137160"/>
+              </a:xfrm>
+              <a:prstGeom prst="ellipse">
+                <a:avLst/>
+              </a:prstGeom>
+              <a:solidFill>
+                <a:schemeClr val="bg1">
+                  <a:lumMod val="85000"/>
+                </a:schemeClr>
+              </a:solidFill>
+              <a:ln w="12700">
+                <a:solidFill>
+                  <a:schemeClr val="tx1"/>
+                </a:solidFill>
+              </a:ln>
+            </p:spPr>
+            <p:style>
+              <a:lnRef idx="2">
+                <a:schemeClr val="accent1">
+                  <a:shade val="50000"/>
+                </a:schemeClr>
+              </a:lnRef>
+              <a:fillRef idx="1">
+                <a:schemeClr val="accent1"/>
+              </a:fillRef>
+              <a:effectRef idx="0">
+                <a:schemeClr val="accent1"/>
+              </a:effectRef>
+              <a:fontRef idx="minor">
+                <a:schemeClr val="lt1"/>
+              </a:fontRef>
+            </p:style>
+            <p:txBody>
+              <a:bodyPr rtlCol="0" anchor="ctr"/>
+              <a:lstStyle/>
+              <a:p>
+                <a:pPr algn="ctr"/>
+                <a:endParaRPr lang="en-US"/>
+              </a:p>
+            </p:txBody>
+          </p:sp>
+          <p:sp>
+            <p:nvSpPr>
+              <p:cNvPr id="160" name="Oval 159"/>
+              <p:cNvSpPr/>
+              <p:nvPr/>
+            </p:nvSpPr>
+            <p:spPr>
+              <a:xfrm>
+                <a:off x="3840480" y="841248"/>
+                <a:ext cx="137160" cy="137160"/>
+              </a:xfrm>
+              <a:prstGeom prst="ellipse">
+                <a:avLst/>
+              </a:prstGeom>
+              <a:solidFill>
+                <a:schemeClr val="bg1">
+                  <a:lumMod val="85000"/>
+                </a:schemeClr>
+              </a:solidFill>
+              <a:ln w="12700">
+                <a:solidFill>
+                  <a:schemeClr val="tx1"/>
+                </a:solidFill>
+              </a:ln>
+            </p:spPr>
+            <p:style>
+              <a:lnRef idx="2">
+                <a:schemeClr val="accent1">
+                  <a:shade val="50000"/>
+                </a:schemeClr>
+              </a:lnRef>
+              <a:fillRef idx="1">
+                <a:schemeClr val="accent1"/>
+              </a:fillRef>
+              <a:effectRef idx="0">
+                <a:schemeClr val="accent1"/>
+              </a:effectRef>
+              <a:fontRef idx="minor">
+                <a:schemeClr val="lt1"/>
+              </a:fontRef>
+            </p:style>
+            <p:txBody>
+              <a:bodyPr rtlCol="0" anchor="ctr"/>
+              <a:lstStyle/>
+              <a:p>
+                <a:pPr algn="ctr"/>
+                <a:endParaRPr lang="en-US"/>
+              </a:p>
+            </p:txBody>
+          </p:sp>
+          <p:sp>
+            <p:nvSpPr>
+              <p:cNvPr id="161" name="TextBox 160"/>
+              <p:cNvSpPr txBox="1"/>
+              <p:nvPr/>
+            </p:nvSpPr>
+            <p:spPr>
+              <a:xfrm>
+                <a:off x="4663440" y="810768"/>
+                <a:ext cx="295274" cy="215444"/>
+              </a:xfrm>
+              <a:prstGeom prst="rect">
+                <a:avLst/>
+              </a:prstGeom>
+              <a:noFill/>
+            </p:spPr>
+            <p:txBody>
+              <a:bodyPr wrap="none" rtlCol="0">
+                <a:spAutoFit/>
+              </a:bodyPr>
+              <a:lstStyle/>
+              <a:p>
+                <a:r>
+                  <a:rPr lang="en-US" sz="800" smtClean="0"/>
+                  <a:t>KV</a:t>
+                </a:r>
+                <a:endParaRPr lang="en-US" sz="800"/>
+              </a:p>
+            </p:txBody>
+          </p:sp>
+          <p:sp>
+            <p:nvSpPr>
+              <p:cNvPr id="162" name="TextBox 161"/>
+              <p:cNvSpPr txBox="1"/>
+              <p:nvPr/>
+            </p:nvSpPr>
+            <p:spPr>
+              <a:xfrm>
+                <a:off x="4626864" y="1011936"/>
+                <a:ext cx="344966" cy="215444"/>
+              </a:xfrm>
+              <a:prstGeom prst="rect">
+                <a:avLst/>
+              </a:prstGeom>
+              <a:noFill/>
+            </p:spPr>
+            <p:txBody>
+              <a:bodyPr wrap="none" rtlCol="0">
+                <a:spAutoFit/>
+              </a:bodyPr>
+              <a:lstStyle/>
+              <a:p>
+                <a:r>
+                  <a:rPr lang="en-US" sz="800" smtClean="0"/>
+                  <a:t>CAS</a:t>
+                </a:r>
+                <a:endParaRPr lang="en-US" sz="800"/>
+              </a:p>
+            </p:txBody>
+          </p:sp>
+          <p:sp>
+            <p:nvSpPr>
+              <p:cNvPr id="163" name="TextBox 162"/>
+              <p:cNvSpPr txBox="1"/>
+              <p:nvPr/>
+            </p:nvSpPr>
+            <p:spPr>
+              <a:xfrm>
+                <a:off x="3919728" y="810768"/>
+                <a:ext cx="295274" cy="215444"/>
+              </a:xfrm>
+              <a:prstGeom prst="rect">
+                <a:avLst/>
+              </a:prstGeom>
+              <a:noFill/>
+            </p:spPr>
+            <p:txBody>
+              <a:bodyPr wrap="none" rtlCol="0">
+                <a:spAutoFit/>
+              </a:bodyPr>
+              <a:lstStyle/>
+              <a:p>
+                <a:r>
+                  <a:rPr lang="en-US" sz="800" smtClean="0"/>
+                  <a:t>KV</a:t>
+                </a:r>
+                <a:endParaRPr lang="en-US" sz="800"/>
+              </a:p>
+            </p:txBody>
+          </p:sp>
+        </p:grpSp>
+      </p:grpSp>
     </p:spTree>
   </p:cSld>
   <p:clrMapOvr>
@@ -13686,6 +14276,105 @@
           <a:chExt cx="0" cy="0"/>
         </a:xfrm>
       </p:grpSpPr>
+      <p:sp>
+        <p:nvSpPr>
+          <p:cNvPr id="115" name="Freeform 114"/>
+          <p:cNvSpPr/>
+          <p:nvPr/>
+        </p:nvSpPr>
+        <p:spPr>
+          <a:xfrm>
+            <a:off x="3410712" y="2395728"/>
+            <a:ext cx="487680" cy="1298448"/>
+          </a:xfrm>
+          <a:custGeom>
+            <a:avLst/>
+            <a:gdLst>
+              <a:gd name="connsiteX0" fmla="*/ 374904 w 487680"/>
+              <a:gd name="connsiteY0" fmla="*/ 0 h 1298448"/>
+              <a:gd name="connsiteX1" fmla="*/ 438912 w 487680"/>
+              <a:gd name="connsiteY1" fmla="*/ 676656 h 1298448"/>
+              <a:gd name="connsiteX2" fmla="*/ 82296 w 487680"/>
+              <a:gd name="connsiteY2" fmla="*/ 987552 h 1298448"/>
+              <a:gd name="connsiteX3" fmla="*/ 0 w 487680"/>
+              <a:gd name="connsiteY3" fmla="*/ 1298448 h 1298448"/>
+            </a:gdLst>
+            <a:ahLst/>
+            <a:cxnLst>
+              <a:cxn ang="0">
+                <a:pos x="connsiteX0" y="connsiteY0"/>
+              </a:cxn>
+              <a:cxn ang="0">
+                <a:pos x="connsiteX1" y="connsiteY1"/>
+              </a:cxn>
+              <a:cxn ang="0">
+                <a:pos x="connsiteX2" y="connsiteY2"/>
+              </a:cxn>
+              <a:cxn ang="0">
+                <a:pos x="connsiteX3" y="connsiteY3"/>
+              </a:cxn>
+            </a:cxnLst>
+            <a:rect l="l" t="t" r="r" b="b"/>
+            <a:pathLst>
+              <a:path w="487680" h="1298448">
+                <a:moveTo>
+                  <a:pt x="374904" y="0"/>
+                </a:moveTo>
+                <a:cubicBezTo>
+                  <a:pt x="431292" y="256032"/>
+                  <a:pt x="487680" y="512064"/>
+                  <a:pt x="438912" y="676656"/>
+                </a:cubicBezTo>
+                <a:cubicBezTo>
+                  <a:pt x="390144" y="841248"/>
+                  <a:pt x="155448" y="883920"/>
+                  <a:pt x="82296" y="987552"/>
+                </a:cubicBezTo>
+                <a:cubicBezTo>
+                  <a:pt x="9144" y="1091184"/>
+                  <a:pt x="4572" y="1194816"/>
+                  <a:pt x="0" y="1298448"/>
+                </a:cubicBezTo>
+              </a:path>
+            </a:pathLst>
+          </a:custGeom>
+          <a:ln w="25400">
+            <a:solidFill>
+              <a:srgbClr val="FFFF00"/>
+            </a:solidFill>
+            <a:tailEnd type="triangle" w="lg" len="lg"/>
+          </a:ln>
+          <a:effectLst>
+            <a:outerShdw blurRad="50800" dist="38100" dir="2700000" algn="tl" rotWithShape="0">
+              <a:prstClr val="black">
+                <a:alpha val="40000"/>
+              </a:prstClr>
+            </a:outerShdw>
+          </a:effectLst>
+        </p:spPr>
+        <p:style>
+          <a:lnRef idx="1">
+            <a:schemeClr val="accent1"/>
+          </a:lnRef>
+          <a:fillRef idx="0">
+            <a:schemeClr val="accent1"/>
+          </a:fillRef>
+          <a:effectRef idx="0">
+            <a:schemeClr val="accent1"/>
+          </a:effectRef>
+          <a:fontRef idx="minor">
+            <a:schemeClr val="tx1"/>
+          </a:fontRef>
+        </p:style>
+        <p:txBody>
+          <a:bodyPr rtlCol="0" anchor="ctr"/>
+          <a:lstStyle/>
+          <a:p>
+            <a:pPr algn="ctr"/>
+            <a:endParaRPr lang="en-US"/>
+          </a:p>
+        </p:txBody>
+      </p:sp>
       <p:sp>
         <p:nvSpPr>
           <p:cNvPr id="98" name="Freeform 97"/>
@@ -13801,7 +14490,7 @@
         </p:nvSpPr>
         <p:spPr>
           <a:xfrm>
-            <a:off x="4434840" y="2090928"/>
+            <a:off x="4434840" y="1862328"/>
             <a:ext cx="1115568" cy="1493520"/>
           </a:xfrm>
           <a:custGeom>
@@ -13900,7 +14589,7 @@
         </p:nvSpPr>
         <p:spPr>
           <a:xfrm>
-            <a:off x="4434840" y="749808"/>
+            <a:off x="4434840" y="658368"/>
             <a:ext cx="1069848" cy="1143000"/>
           </a:xfrm>
           <a:custGeom>
@@ -13999,7 +14688,7 @@
         </p:nvSpPr>
         <p:spPr>
           <a:xfrm>
-            <a:off x="6821424" y="960120"/>
+            <a:off x="6821424" y="868680"/>
             <a:ext cx="777240" cy="941832"/>
           </a:xfrm>
           <a:custGeom>
@@ -14119,7 +14808,7 @@
               <a:avLst/>
             </a:prstGeom>
             <a:solidFill>
-              <a:srgbClr val="FFFFCC"/>
+              <a:srgbClr val="FFFF99"/>
             </a:solidFill>
             <a:ln>
               <a:solidFill>
@@ -14656,7 +15345,7 @@
         </p:nvGrpSpPr>
         <p:grpSpPr>
           <a:xfrm>
-            <a:off x="3083178" y="1566672"/>
+            <a:off x="7562088" y="1325880"/>
             <a:ext cx="1354710" cy="879908"/>
             <a:chOff x="486282" y="1466088"/>
             <a:chExt cx="1354710" cy="879908"/>
@@ -15216,7 +15905,7 @@
         </p:nvGrpSpPr>
         <p:grpSpPr>
           <a:xfrm>
-            <a:off x="5478906" y="3267456"/>
+            <a:off x="3124200" y="1524000"/>
             <a:ext cx="1363854" cy="879908"/>
             <a:chOff x="477138" y="2453640"/>
             <a:chExt cx="1363854" cy="879908"/>
@@ -15776,7 +16465,7 @@
         </p:nvGrpSpPr>
         <p:grpSpPr>
           <a:xfrm>
-            <a:off x="5451474" y="441960"/>
+            <a:off x="5443728" y="347472"/>
             <a:ext cx="1363854" cy="879908"/>
             <a:chOff x="477138" y="3450336"/>
             <a:chExt cx="1363854" cy="879908"/>
@@ -16334,7 +17023,7 @@
         </p:nvGrpSpPr>
         <p:grpSpPr>
           <a:xfrm>
-            <a:off x="7545450" y="1566672"/>
+            <a:off x="5510784" y="3044952"/>
             <a:ext cx="1363854" cy="879908"/>
             <a:chOff x="477138" y="4437888"/>
             <a:chExt cx="1363854" cy="879908"/>
@@ -16887,6 +17576,646 @@
           </p:sp>
         </p:grpSp>
       </p:grpSp>
+      <p:grpSp>
+        <p:nvGrpSpPr>
+          <p:cNvPr id="94" name="Group 93"/>
+          <p:cNvGrpSpPr/>
+          <p:nvPr/>
+        </p:nvGrpSpPr>
+        <p:grpSpPr>
+          <a:xfrm>
+            <a:off x="2746248" y="3733800"/>
+            <a:ext cx="1363854" cy="879908"/>
+            <a:chOff x="3741546" y="5556504"/>
+            <a:chExt cx="1363854" cy="879908"/>
+          </a:xfrm>
+        </p:grpSpPr>
+        <p:sp>
+          <p:nvSpPr>
+            <p:cNvPr id="95" name="Rectangle 94"/>
+            <p:cNvSpPr/>
+            <p:nvPr/>
+          </p:nvSpPr>
+          <p:spPr>
+            <a:xfrm>
+              <a:off x="3810000" y="5562600"/>
+              <a:ext cx="1295400" cy="838200"/>
+            </a:xfrm>
+            <a:prstGeom prst="rect">
+              <a:avLst/>
+            </a:prstGeom>
+            <a:solidFill>
+              <a:schemeClr val="bg2">
+                <a:lumMod val="75000"/>
+              </a:schemeClr>
+            </a:solidFill>
+            <a:ln>
+              <a:solidFill>
+                <a:schemeClr val="tx1"/>
+              </a:solidFill>
+            </a:ln>
+            <a:effectLst>
+              <a:outerShdw blurRad="50800" dist="38100" dir="2700000" algn="tl" rotWithShape="0">
+                <a:prstClr val="black">
+                  <a:alpha val="40000"/>
+                </a:prstClr>
+              </a:outerShdw>
+            </a:effectLst>
+            <a:scene3d>
+              <a:camera prst="orthographicFront"/>
+              <a:lightRig rig="threePt" dir="t"/>
+            </a:scene3d>
+            <a:sp3d>
+              <a:bevelT w="50800" h="50800"/>
+            </a:sp3d>
+          </p:spPr>
+          <p:style>
+            <a:lnRef idx="2">
+              <a:schemeClr val="accent1">
+                <a:shade val="50000"/>
+              </a:schemeClr>
+            </a:lnRef>
+            <a:fillRef idx="1">
+              <a:schemeClr val="accent1"/>
+            </a:fillRef>
+            <a:effectRef idx="0">
+              <a:schemeClr val="accent1"/>
+            </a:effectRef>
+            <a:fontRef idx="minor">
+              <a:schemeClr val="lt1"/>
+            </a:fontRef>
+          </p:style>
+          <p:txBody>
+            <a:bodyPr rtlCol="0" anchor="ctr"/>
+            <a:lstStyle/>
+            <a:p>
+              <a:pPr algn="ctr"/>
+              <a:endParaRPr lang="en-US"/>
+            </a:p>
+          </p:txBody>
+        </p:sp>
+        <p:grpSp>
+          <p:nvGrpSpPr>
+            <p:cNvPr id="96" name="Group 148"/>
+            <p:cNvGrpSpPr/>
+            <p:nvPr/>
+          </p:nvGrpSpPr>
+          <p:grpSpPr>
+            <a:xfrm>
+              <a:off x="3741546" y="5556504"/>
+              <a:ext cx="1342518" cy="879908"/>
+              <a:chOff x="3744594" y="600456"/>
+              <a:chExt cx="1342518" cy="879908"/>
+            </a:xfrm>
+          </p:grpSpPr>
+          <p:pic>
+            <p:nvPicPr>
+              <p:cNvPr id="97" name="Picture 96" descr="led-yellow.png"/>
+              <p:cNvPicPr>
+                <a:picLocks noChangeAspect="1"/>
+              </p:cNvPicPr>
+              <p:nvPr/>
+            </p:nvPicPr>
+            <p:blipFill>
+              <a:blip r:embed="rId2" cstate="print"/>
+              <a:stretch>
+                <a:fillRect/>
+              </a:stretch>
+            </p:blipFill>
+            <p:spPr>
+              <a:xfrm>
+                <a:off x="3828288" y="627888"/>
+                <a:ext cx="152400" cy="152400"/>
+              </a:xfrm>
+              <a:prstGeom prst="rect">
+                <a:avLst/>
+              </a:prstGeom>
+            </p:spPr>
+          </p:pic>
+          <p:pic>
+            <p:nvPicPr>
+              <p:cNvPr id="102" name="Picture 101" descr="help_icon.png"/>
+              <p:cNvPicPr>
+                <a:picLocks noChangeAspect="1"/>
+              </p:cNvPicPr>
+              <p:nvPr/>
+            </p:nvPicPr>
+            <p:blipFill>
+              <a:blip r:embed="rId3" cstate="print"/>
+              <a:stretch>
+                <a:fillRect/>
+              </a:stretch>
+            </p:blipFill>
+            <p:spPr>
+              <a:xfrm>
+                <a:off x="4934712" y="618744"/>
+                <a:ext cx="152400" cy="152400"/>
+              </a:xfrm>
+              <a:prstGeom prst="rect">
+                <a:avLst/>
+              </a:prstGeom>
+            </p:spPr>
+          </p:pic>
+          <p:pic>
+            <p:nvPicPr>
+              <p:cNvPr id="103" name="Picture 102" descr="gtk-execute.png"/>
+              <p:cNvPicPr>
+                <a:picLocks noChangeAspect="1"/>
+              </p:cNvPicPr>
+              <p:nvPr/>
+            </p:nvPicPr>
+            <p:blipFill>
+              <a:blip r:embed="rId4" cstate="print"/>
+              <a:stretch>
+                <a:fillRect/>
+              </a:stretch>
+            </p:blipFill>
+            <p:spPr>
+              <a:xfrm>
+                <a:off x="4782312" y="627888"/>
+                <a:ext cx="152400" cy="152400"/>
+              </a:xfrm>
+              <a:prstGeom prst="rect">
+                <a:avLst/>
+              </a:prstGeom>
+            </p:spPr>
+          </p:pic>
+          <p:pic>
+            <p:nvPicPr>
+              <p:cNvPr id="104" name="Picture 103" descr="zoom.png"/>
+              <p:cNvPicPr>
+                <a:picLocks noChangeAspect="1"/>
+              </p:cNvPicPr>
+              <p:nvPr/>
+            </p:nvPicPr>
+            <p:blipFill>
+              <a:blip r:embed="rId5" cstate="print"/>
+              <a:stretch>
+                <a:fillRect/>
+              </a:stretch>
+            </p:blipFill>
+            <p:spPr>
+              <a:xfrm>
+                <a:off x="4613668" y="627888"/>
+                <a:ext cx="155448" cy="155448"/>
+              </a:xfrm>
+              <a:prstGeom prst="rect">
+                <a:avLst/>
+              </a:prstGeom>
+            </p:spPr>
+          </p:pic>
+          <p:sp>
+            <p:nvSpPr>
+              <p:cNvPr id="105" name="Oval 104"/>
+              <p:cNvSpPr/>
+              <p:nvPr/>
+            </p:nvSpPr>
+            <p:spPr>
+              <a:xfrm>
+                <a:off x="4901184" y="841248"/>
+                <a:ext cx="137160" cy="137160"/>
+              </a:xfrm>
+              <a:prstGeom prst="ellipse">
+                <a:avLst/>
+              </a:prstGeom>
+              <a:solidFill>
+                <a:schemeClr val="bg1">
+                  <a:lumMod val="85000"/>
+                </a:schemeClr>
+              </a:solidFill>
+              <a:ln w="12700">
+                <a:solidFill>
+                  <a:schemeClr val="tx1"/>
+                </a:solidFill>
+              </a:ln>
+            </p:spPr>
+            <p:style>
+              <a:lnRef idx="2">
+                <a:schemeClr val="accent1">
+                  <a:shade val="50000"/>
+                </a:schemeClr>
+              </a:lnRef>
+              <a:fillRef idx="1">
+                <a:schemeClr val="accent1"/>
+              </a:fillRef>
+              <a:effectRef idx="0">
+                <a:schemeClr val="accent1"/>
+              </a:effectRef>
+              <a:fontRef idx="minor">
+                <a:schemeClr val="lt1"/>
+              </a:fontRef>
+            </p:style>
+            <p:txBody>
+              <a:bodyPr rtlCol="0" anchor="ctr"/>
+              <a:lstStyle/>
+              <a:p>
+                <a:pPr algn="ctr"/>
+                <a:endParaRPr lang="en-US"/>
+              </a:p>
+            </p:txBody>
+          </p:sp>
+          <p:cxnSp>
+            <p:nvCxnSpPr>
+              <p:cNvPr id="106" name="Straight Connector 105"/>
+              <p:cNvCxnSpPr/>
+              <p:nvPr/>
+            </p:nvCxnSpPr>
+            <p:spPr>
+              <a:xfrm>
+                <a:off x="3886200" y="801624"/>
+                <a:ext cx="1143000" cy="0"/>
+              </a:xfrm>
+              <a:prstGeom prst="line">
+                <a:avLst/>
+              </a:prstGeom>
+              <a:ln>
+                <a:solidFill>
+                  <a:schemeClr val="tx1"/>
+                </a:solidFill>
+              </a:ln>
+            </p:spPr>
+            <p:style>
+              <a:lnRef idx="1">
+                <a:schemeClr val="accent1"/>
+              </a:lnRef>
+              <a:fillRef idx="0">
+                <a:schemeClr val="accent1"/>
+              </a:fillRef>
+              <a:effectRef idx="0">
+                <a:schemeClr val="accent1"/>
+              </a:effectRef>
+              <a:fontRef idx="minor">
+                <a:schemeClr val="tx1"/>
+              </a:fontRef>
+            </p:style>
+          </p:cxnSp>
+          <p:cxnSp>
+            <p:nvCxnSpPr>
+              <p:cNvPr id="107" name="Straight Connector 106"/>
+              <p:cNvCxnSpPr/>
+              <p:nvPr/>
+            </p:nvCxnSpPr>
+            <p:spPr>
+              <a:xfrm>
+                <a:off x="3886200" y="1295400"/>
+                <a:ext cx="1143000" cy="0"/>
+              </a:xfrm>
+              <a:prstGeom prst="line">
+                <a:avLst/>
+              </a:prstGeom>
+              <a:ln>
+                <a:solidFill>
+                  <a:schemeClr val="tx1"/>
+                </a:solidFill>
+              </a:ln>
+            </p:spPr>
+            <p:style>
+              <a:lnRef idx="1">
+                <a:schemeClr val="accent1"/>
+              </a:lnRef>
+              <a:fillRef idx="0">
+                <a:schemeClr val="accent1"/>
+              </a:fillRef>
+              <a:effectRef idx="0">
+                <a:schemeClr val="accent1"/>
+              </a:effectRef>
+              <a:fontRef idx="minor">
+                <a:schemeClr val="tx1"/>
+              </a:fontRef>
+            </p:style>
+          </p:cxnSp>
+          <p:sp>
+            <p:nvSpPr>
+              <p:cNvPr id="108" name="TextBox 107"/>
+              <p:cNvSpPr txBox="1"/>
+              <p:nvPr/>
+            </p:nvSpPr>
+            <p:spPr>
+              <a:xfrm>
+                <a:off x="3744594" y="1264920"/>
+                <a:ext cx="486030" cy="215444"/>
+              </a:xfrm>
+              <a:prstGeom prst="rect">
+                <a:avLst/>
+              </a:prstGeom>
+              <a:noFill/>
+            </p:spPr>
+            <p:txBody>
+              <a:bodyPr wrap="none" rtlCol="0">
+                <a:spAutoFit/>
+              </a:bodyPr>
+              <a:lstStyle/>
+              <a:p>
+                <a:r>
+                  <a:rPr lang="en-US" sz="800" smtClean="0"/>
+                  <a:t>Ex: 0 R:</a:t>
+                </a:r>
+                <a:endParaRPr lang="en-US" sz="800"/>
+              </a:p>
+            </p:txBody>
+          </p:sp>
+          <p:sp>
+            <p:nvSpPr>
+              <p:cNvPr id="109" name="TextBox 108"/>
+              <p:cNvSpPr txBox="1"/>
+              <p:nvPr/>
+            </p:nvSpPr>
+            <p:spPr>
+              <a:xfrm>
+                <a:off x="3912009" y="600456"/>
+                <a:ext cx="614271" cy="215444"/>
+              </a:xfrm>
+              <a:prstGeom prst="rect">
+                <a:avLst/>
+              </a:prstGeom>
+              <a:noFill/>
+            </p:spPr>
+            <p:txBody>
+              <a:bodyPr wrap="none" rtlCol="0">
+                <a:spAutoFit/>
+              </a:bodyPr>
+              <a:lstStyle/>
+              <a:p>
+                <a:r>
+                  <a:rPr lang="en-US" sz="800" smtClean="0"/>
+                  <a:t>HoopLoad</a:t>
+                </a:r>
+                <a:endParaRPr lang="en-US" sz="800"/>
+              </a:p>
+            </p:txBody>
+          </p:sp>
+          <p:sp>
+            <p:nvSpPr>
+              <p:cNvPr id="110" name="Oval 109"/>
+              <p:cNvSpPr/>
+              <p:nvPr/>
+            </p:nvSpPr>
+            <p:spPr>
+              <a:xfrm>
+                <a:off x="4904232" y="1048512"/>
+                <a:ext cx="137160" cy="137160"/>
+              </a:xfrm>
+              <a:prstGeom prst="ellipse">
+                <a:avLst/>
+              </a:prstGeom>
+              <a:solidFill>
+                <a:schemeClr val="bg1">
+                  <a:lumMod val="85000"/>
+                </a:schemeClr>
+              </a:solidFill>
+              <a:ln w="12700">
+                <a:solidFill>
+                  <a:schemeClr val="tx1"/>
+                </a:solidFill>
+              </a:ln>
+            </p:spPr>
+            <p:style>
+              <a:lnRef idx="2">
+                <a:schemeClr val="accent1">
+                  <a:shade val="50000"/>
+                </a:schemeClr>
+              </a:lnRef>
+              <a:fillRef idx="1">
+                <a:schemeClr val="accent1"/>
+              </a:fillRef>
+              <a:effectRef idx="0">
+                <a:schemeClr val="accent1"/>
+              </a:effectRef>
+              <a:fontRef idx="minor">
+                <a:schemeClr val="lt1"/>
+              </a:fontRef>
+            </p:style>
+            <p:txBody>
+              <a:bodyPr rtlCol="0" anchor="ctr"/>
+              <a:lstStyle/>
+              <a:p>
+                <a:pPr algn="ctr"/>
+                <a:endParaRPr lang="en-US"/>
+              </a:p>
+            </p:txBody>
+          </p:sp>
+          <p:sp>
+            <p:nvSpPr>
+              <p:cNvPr id="111" name="Oval 110"/>
+              <p:cNvSpPr/>
+              <p:nvPr/>
+            </p:nvSpPr>
+            <p:spPr>
+              <a:xfrm>
+                <a:off x="3840480" y="841248"/>
+                <a:ext cx="137160" cy="137160"/>
+              </a:xfrm>
+              <a:prstGeom prst="ellipse">
+                <a:avLst/>
+              </a:prstGeom>
+              <a:solidFill>
+                <a:schemeClr val="bg1">
+                  <a:lumMod val="85000"/>
+                </a:schemeClr>
+              </a:solidFill>
+              <a:ln w="12700">
+                <a:solidFill>
+                  <a:schemeClr val="tx1"/>
+                </a:solidFill>
+              </a:ln>
+            </p:spPr>
+            <p:style>
+              <a:lnRef idx="2">
+                <a:schemeClr val="accent1">
+                  <a:shade val="50000"/>
+                </a:schemeClr>
+              </a:lnRef>
+              <a:fillRef idx="1">
+                <a:schemeClr val="accent1"/>
+              </a:fillRef>
+              <a:effectRef idx="0">
+                <a:schemeClr val="accent1"/>
+              </a:effectRef>
+              <a:fontRef idx="minor">
+                <a:schemeClr val="lt1"/>
+              </a:fontRef>
+            </p:style>
+            <p:txBody>
+              <a:bodyPr rtlCol="0" anchor="ctr"/>
+              <a:lstStyle/>
+              <a:p>
+                <a:pPr algn="ctr"/>
+                <a:endParaRPr lang="en-US"/>
+              </a:p>
+            </p:txBody>
+          </p:sp>
+          <p:sp>
+            <p:nvSpPr>
+              <p:cNvPr id="112" name="TextBox 111"/>
+              <p:cNvSpPr txBox="1"/>
+              <p:nvPr/>
+            </p:nvSpPr>
+            <p:spPr>
+              <a:xfrm>
+                <a:off x="4663440" y="810768"/>
+                <a:ext cx="295274" cy="215444"/>
+              </a:xfrm>
+              <a:prstGeom prst="rect">
+                <a:avLst/>
+              </a:prstGeom>
+              <a:noFill/>
+            </p:spPr>
+            <p:txBody>
+              <a:bodyPr wrap="none" rtlCol="0">
+                <a:spAutoFit/>
+              </a:bodyPr>
+              <a:lstStyle/>
+              <a:p>
+                <a:r>
+                  <a:rPr lang="en-US" sz="800" smtClean="0"/>
+                  <a:t>KV</a:t>
+                </a:r>
+                <a:endParaRPr lang="en-US" sz="800"/>
+              </a:p>
+            </p:txBody>
+          </p:sp>
+          <p:sp>
+            <p:nvSpPr>
+              <p:cNvPr id="113" name="TextBox 112"/>
+              <p:cNvSpPr txBox="1"/>
+              <p:nvPr/>
+            </p:nvSpPr>
+            <p:spPr>
+              <a:xfrm>
+                <a:off x="4626864" y="1011936"/>
+                <a:ext cx="344966" cy="215444"/>
+              </a:xfrm>
+              <a:prstGeom prst="rect">
+                <a:avLst/>
+              </a:prstGeom>
+              <a:noFill/>
+            </p:spPr>
+            <p:txBody>
+              <a:bodyPr wrap="none" rtlCol="0">
+                <a:spAutoFit/>
+              </a:bodyPr>
+              <a:lstStyle/>
+              <a:p>
+                <a:r>
+                  <a:rPr lang="en-US" sz="800" smtClean="0"/>
+                  <a:t>CAS</a:t>
+                </a:r>
+                <a:endParaRPr lang="en-US" sz="800"/>
+              </a:p>
+            </p:txBody>
+          </p:sp>
+          <p:sp>
+            <p:nvSpPr>
+              <p:cNvPr id="114" name="TextBox 113"/>
+              <p:cNvSpPr txBox="1"/>
+              <p:nvPr/>
+            </p:nvSpPr>
+            <p:spPr>
+              <a:xfrm>
+                <a:off x="3919728" y="810768"/>
+                <a:ext cx="295274" cy="215444"/>
+              </a:xfrm>
+              <a:prstGeom prst="rect">
+                <a:avLst/>
+              </a:prstGeom>
+              <a:noFill/>
+            </p:spPr>
+            <p:txBody>
+              <a:bodyPr wrap="none" rtlCol="0">
+                <a:spAutoFit/>
+              </a:bodyPr>
+              <a:lstStyle/>
+              <a:p>
+                <a:r>
+                  <a:rPr lang="en-US" sz="800" smtClean="0"/>
+                  <a:t>KV</a:t>
+                </a:r>
+                <a:endParaRPr lang="en-US" sz="800"/>
+              </a:p>
+            </p:txBody>
+          </p:sp>
+        </p:grpSp>
+      </p:grpSp>
+      <p:sp>
+        <p:nvSpPr>
+          <p:cNvPr id="116" name="Oval 115"/>
+          <p:cNvSpPr/>
+          <p:nvPr/>
+        </p:nvSpPr>
+        <p:spPr>
+          <a:xfrm>
+            <a:off x="7654926" y="1737360"/>
+            <a:ext cx="137160" cy="137160"/>
+          </a:xfrm>
+          <a:prstGeom prst="ellipse">
+            <a:avLst/>
+          </a:prstGeom>
+          <a:solidFill>
+            <a:schemeClr val="bg1">
+              <a:lumMod val="85000"/>
+            </a:schemeClr>
+          </a:solidFill>
+          <a:ln w="12700">
+            <a:solidFill>
+              <a:schemeClr val="tx1"/>
+            </a:solidFill>
+          </a:ln>
+        </p:spPr>
+        <p:style>
+          <a:lnRef idx="2">
+            <a:schemeClr val="accent1">
+              <a:shade val="50000"/>
+            </a:schemeClr>
+          </a:lnRef>
+          <a:fillRef idx="1">
+            <a:schemeClr val="accent1"/>
+          </a:fillRef>
+          <a:effectRef idx="0">
+            <a:schemeClr val="accent1"/>
+          </a:effectRef>
+          <a:fontRef idx="minor">
+            <a:schemeClr val="lt1"/>
+          </a:fontRef>
+        </p:style>
+        <p:txBody>
+          <a:bodyPr rtlCol="0" anchor="ctr"/>
+          <a:lstStyle/>
+          <a:p>
+            <a:pPr algn="ctr"/>
+            <a:endParaRPr lang="en-US"/>
+          </a:p>
+        </p:txBody>
+      </p:sp>
+      <p:sp>
+        <p:nvSpPr>
+          <p:cNvPr id="117" name="TextBox 116"/>
+          <p:cNvSpPr txBox="1"/>
+          <p:nvPr/>
+        </p:nvSpPr>
+        <p:spPr>
+          <a:xfrm>
+            <a:off x="7734174" y="1706880"/>
+            <a:ext cx="344966" cy="215444"/>
+          </a:xfrm>
+          <a:prstGeom prst="rect">
+            <a:avLst/>
+          </a:prstGeom>
+          <a:noFill/>
+        </p:spPr>
+        <p:txBody>
+          <a:bodyPr wrap="none" rtlCol="0">
+            <a:spAutoFit/>
+          </a:bodyPr>
+          <a:lstStyle/>
+          <a:p>
+            <a:r>
+              <a:rPr lang="en-US" sz="800" smtClean="0"/>
+              <a:t>CAS</a:t>
+            </a:r>
+            <a:endParaRPr lang="en-US" sz="800"/>
+          </a:p>
+        </p:txBody>
+      </p:sp>
     </p:spTree>
   </p:cSld>
   <p:clrMapOvr>

</xml_diff>